<commit_message>
Update do Projeto e do PPT.
</commit_message>
<xml_diff>
--- a/TransferFunctionResearch.pptx
+++ b/TransferFunctionResearch.pptx
@@ -5,20 +5,27 @@
     <p:sldMasterId id="2147483972" r:id="rId1"/>
   </p:sldMasterIdLst>
   <p:notesMasterIdLst>
-    <p:notesMasterId r:id="rId10"/>
+    <p:notesMasterId r:id="rId17"/>
   </p:notesMasterIdLst>
   <p:handoutMasterIdLst>
-    <p:handoutMasterId r:id="rId11"/>
+    <p:handoutMasterId r:id="rId18"/>
   </p:handoutMasterIdLst>
   <p:sldIdLst>
     <p:sldId id="258" r:id="rId2"/>
     <p:sldId id="268" r:id="rId3"/>
     <p:sldId id="269" r:id="rId4"/>
-    <p:sldId id="263" r:id="rId5"/>
-    <p:sldId id="270" r:id="rId6"/>
-    <p:sldId id="264" r:id="rId7"/>
-    <p:sldId id="271" r:id="rId8"/>
-    <p:sldId id="260" r:id="rId9"/>
+    <p:sldId id="272" r:id="rId5"/>
+    <p:sldId id="263" r:id="rId6"/>
+    <p:sldId id="274" r:id="rId7"/>
+    <p:sldId id="270" r:id="rId8"/>
+    <p:sldId id="264" r:id="rId9"/>
+    <p:sldId id="271" r:id="rId10"/>
+    <p:sldId id="273" r:id="rId11"/>
+    <p:sldId id="277" r:id="rId12"/>
+    <p:sldId id="275" r:id="rId13"/>
+    <p:sldId id="278" r:id="rId14"/>
+    <p:sldId id="279" r:id="rId15"/>
+    <p:sldId id="260" r:id="rId16"/>
   </p:sldIdLst>
   <p:sldSz cx="9144000" cy="6858000" type="screen4x3"/>
   <p:notesSz cx="6858000" cy="9144000"/>
@@ -202,7 +209,7 @@
           <a:p>
             <a:fld id="{D94871EF-037F-4DB0-8D8D-4E34296C3851}" type="datetimeFigureOut">
               <a:rPr lang="pt-BR" smtClean="0"/>
-              <a:t>20/06/2016</a:t>
+              <a:t>27/06/2016</a:t>
             </a:fld>
             <a:endParaRPr lang="pt-BR"/>
           </a:p>
@@ -367,7 +374,7 @@
           <a:p>
             <a:fld id="{D06A943A-0473-43BB-BFCA-848723892F29}" type="datetimeFigureOut">
               <a:rPr lang="pt-BR" smtClean="0"/>
-              <a:t>20/06/2016</a:t>
+              <a:t>27/06/2016</a:t>
             </a:fld>
             <a:endParaRPr lang="pt-BR"/>
           </a:p>
@@ -827,7 +834,7 @@
           <a:p>
             <a:fld id="{F7E3E396-4953-408D-8E62-B09E864E185B}" type="datetimeFigureOut">
               <a:rPr lang="pt-BR" smtClean="0"/>
-              <a:t>20/06/2016</a:t>
+              <a:t>27/06/2016</a:t>
             </a:fld>
             <a:endParaRPr lang="pt-BR"/>
           </a:p>
@@ -992,7 +999,7 @@
           <a:p>
             <a:fld id="{F7E3E396-4953-408D-8E62-B09E864E185B}" type="datetimeFigureOut">
               <a:rPr lang="pt-BR" smtClean="0"/>
-              <a:t>20/06/2016</a:t>
+              <a:t>27/06/2016</a:t>
             </a:fld>
             <a:endParaRPr lang="pt-BR"/>
           </a:p>
@@ -1174,7 +1181,7 @@
           <a:p>
             <a:fld id="{F7E3E396-4953-408D-8E62-B09E864E185B}" type="datetimeFigureOut">
               <a:rPr lang="pt-BR" smtClean="0"/>
-              <a:t>20/06/2016</a:t>
+              <a:t>27/06/2016</a:t>
             </a:fld>
             <a:endParaRPr lang="pt-BR" dirty="0"/>
           </a:p>
@@ -1364,7 +1371,7 @@
           <a:p>
             <a:fld id="{F7E3E396-4953-408D-8E62-B09E864E185B}" type="datetimeFigureOut">
               <a:rPr lang="pt-BR" smtClean="0"/>
-              <a:t>20/06/2016</a:t>
+              <a:t>27/06/2016</a:t>
             </a:fld>
             <a:endParaRPr lang="pt-BR"/>
           </a:p>
@@ -1626,7 +1633,7 @@
           <a:p>
             <a:fld id="{F7E3E396-4953-408D-8E62-B09E864E185B}" type="datetimeFigureOut">
               <a:rPr lang="pt-BR" smtClean="0"/>
-              <a:t>20/06/2016</a:t>
+              <a:t>27/06/2016</a:t>
             </a:fld>
             <a:endParaRPr lang="pt-BR"/>
           </a:p>
@@ -1981,7 +1988,7 @@
           <a:p>
             <a:fld id="{F7E3E396-4953-408D-8E62-B09E864E185B}" type="datetimeFigureOut">
               <a:rPr lang="pt-BR" smtClean="0"/>
-              <a:t>20/06/2016</a:t>
+              <a:t>27/06/2016</a:t>
             </a:fld>
             <a:endParaRPr lang="pt-BR"/>
           </a:p>
@@ -2289,7 +2296,7 @@
           <a:p>
             <a:fld id="{F7E3E396-4953-408D-8E62-B09E864E185B}" type="datetimeFigureOut">
               <a:rPr lang="pt-BR" smtClean="0"/>
-              <a:t>20/06/2016</a:t>
+              <a:t>27/06/2016</a:t>
             </a:fld>
             <a:endParaRPr lang="pt-BR"/>
           </a:p>
@@ -2516,7 +2523,7 @@
           <a:p>
             <a:fld id="{F7E3E396-4953-408D-8E62-B09E864E185B}" type="datetimeFigureOut">
               <a:rPr lang="pt-BR" smtClean="0"/>
-              <a:t>20/06/2016</a:t>
+              <a:t>27/06/2016</a:t>
             </a:fld>
             <a:endParaRPr lang="pt-BR"/>
           </a:p>
@@ -2613,7 +2620,7 @@
           <a:p>
             <a:fld id="{F7E3E396-4953-408D-8E62-B09E864E185B}" type="datetimeFigureOut">
               <a:rPr lang="pt-BR" smtClean="0"/>
-              <a:t>20/06/2016</a:t>
+              <a:t>27/06/2016</a:t>
             </a:fld>
             <a:endParaRPr lang="pt-BR"/>
           </a:p>
@@ -2931,7 +2938,7 @@
           <a:p>
             <a:fld id="{F7E3E396-4953-408D-8E62-B09E864E185B}" type="datetimeFigureOut">
               <a:rPr lang="pt-BR" smtClean="0"/>
-              <a:t>20/06/2016</a:t>
+              <a:t>27/06/2016</a:t>
             </a:fld>
             <a:endParaRPr lang="pt-BR"/>
           </a:p>
@@ -3207,7 +3214,7 @@
           <a:p>
             <a:fld id="{F7E3E396-4953-408D-8E62-B09E864E185B}" type="datetimeFigureOut">
               <a:rPr lang="pt-BR" smtClean="0"/>
-              <a:t>20/06/2016</a:t>
+              <a:t>27/06/2016</a:t>
             </a:fld>
             <a:endParaRPr lang="pt-BR"/>
           </a:p>
@@ -3448,7 +3455,7 @@
           <a:p>
             <a:fld id="{F7E3E396-4953-408D-8E62-B09E864E185B}" type="datetimeFigureOut">
               <a:rPr lang="pt-BR" smtClean="0"/>
-              <a:t>20/06/2016</a:t>
+              <a:t>27/06/2016</a:t>
             </a:fld>
             <a:endParaRPr lang="pt-BR"/>
           </a:p>
@@ -4058,7 +4065,7 @@
 </p:sld>
 </file>
 
-<file path=ppt/slides/slide2.xml><?xml version="1.0" encoding="utf-8"?>
+<file path=ppt/slides/slide10.xml><?xml version="1.0" encoding="utf-8"?>
 <p:sld xmlns:a="http://schemas.openxmlformats.org/drawingml/2006/main" xmlns:r="http://schemas.openxmlformats.org/officeDocument/2006/relationships" xmlns:p="http://schemas.openxmlformats.org/presentationml/2006/main">
   <p:cSld>
     <p:spTree>
@@ -4094,7 +4101,7 @@
               <a:rPr lang="en-US" sz="4400" dirty="0" err="1" smtClean="0">
                 <a:latin typeface="Calibri" panose="020F0502020204030204" pitchFamily="34" charset="0"/>
               </a:rPr>
-              <a:t>Objetivo</a:t>
+              <a:t>Resultados</a:t>
             </a:r>
             <a:endParaRPr lang="pt-BR" sz="4400" dirty="0"/>
           </a:p>
@@ -4117,6 +4124,150 @@
           </a:bodyPr>
           <a:lstStyle/>
           <a:p>
+            <a:r>
+              <a:rPr lang="pt-BR" sz="2000" dirty="0" smtClean="0">
+                <a:solidFill>
+                  <a:schemeClr val="tx1">
+                    <a:lumMod val="75000"/>
+                    <a:lumOff val="25000"/>
+                  </a:schemeClr>
+                </a:solidFill>
+                <a:latin typeface="Calibri" panose="020F0502020204030204" pitchFamily="34" charset="0"/>
+              </a:rPr>
+              <a:t>Modelo de uma peça de máquina:</a:t>
+            </a:r>
+          </a:p>
+        </p:txBody>
+      </p:sp>
+      <p:pic>
+        <p:nvPicPr>
+          <p:cNvPr id="9" name="Imagem 8"/>
+          <p:cNvPicPr/>
+          <p:nvPr/>
+        </p:nvPicPr>
+        <p:blipFill>
+          <a:blip r:embed="rId2">
+            <a:extLst>
+              <a:ext uri="{28A0092B-C50C-407E-A947-70E740481C1C}">
+                <a14:useLocalDpi xmlns:a14="http://schemas.microsoft.com/office/drawing/2010/main" val="0"/>
+              </a:ext>
+            </a:extLst>
+          </a:blip>
+          <a:stretch>
+            <a:fillRect/>
+          </a:stretch>
+        </p:blipFill>
+        <p:spPr>
+          <a:xfrm>
+            <a:off x="3101945" y="2393885"/>
+            <a:ext cx="3067105" cy="3105704"/>
+          </a:xfrm>
+          <a:prstGeom prst="rect">
+            <a:avLst/>
+          </a:prstGeom>
+        </p:spPr>
+      </p:pic>
+    </p:spTree>
+    <p:extLst>
+      <p:ext uri="{BB962C8B-B14F-4D97-AF65-F5344CB8AC3E}">
+        <p14:creationId xmlns:p14="http://schemas.microsoft.com/office/powerpoint/2010/main" val="2720414102"/>
+      </p:ext>
+    </p:extLst>
+  </p:cSld>
+  <p:clrMapOvr>
+    <a:masterClrMapping/>
+  </p:clrMapOvr>
+  <p:timing>
+    <p:tnLst>
+      <p:par>
+        <p:cTn id="1" dur="indefinite" restart="never" nodeType="tmRoot"/>
+      </p:par>
+    </p:tnLst>
+  </p:timing>
+</p:sld>
+</file>
+
+<file path=ppt/slides/slide11.xml><?xml version="1.0" encoding="utf-8"?>
+<p:sld xmlns:a="http://schemas.openxmlformats.org/drawingml/2006/main" xmlns:r="http://schemas.openxmlformats.org/officeDocument/2006/relationships" xmlns:p="http://schemas.openxmlformats.org/presentationml/2006/main">
+  <p:cSld>
+    <p:spTree>
+      <p:nvGrpSpPr>
+        <p:cNvPr id="1" name=""/>
+        <p:cNvGrpSpPr/>
+        <p:nvPr/>
+      </p:nvGrpSpPr>
+      <p:grpSpPr>
+        <a:xfrm>
+          <a:off x="0" y="0"/>
+          <a:ext cx="0" cy="0"/>
+          <a:chOff x="0" y="0"/>
+          <a:chExt cx="0" cy="0"/>
+        </a:xfrm>
+      </p:grpSpPr>
+      <p:sp>
+        <p:nvSpPr>
+          <p:cNvPr id="2" name="Title 1"/>
+          <p:cNvSpPr>
+            <a:spLocks noGrp="1"/>
+          </p:cNvSpPr>
+          <p:nvPr>
+            <p:ph type="title"/>
+          </p:nvPr>
+        </p:nvSpPr>
+        <p:spPr/>
+        <p:txBody>
+          <a:bodyPr anchor="ctr"/>
+          <a:lstStyle/>
+          <a:p>
+            <a:r>
+              <a:rPr lang="en-US" sz="4400" dirty="0" err="1" smtClean="0">
+                <a:latin typeface="Calibri" panose="020F0502020204030204" pitchFamily="34" charset="0"/>
+              </a:rPr>
+              <a:t>Resultados</a:t>
+            </a:r>
+            <a:endParaRPr lang="pt-BR" sz="4400" dirty="0"/>
+          </a:p>
+        </p:txBody>
+      </p:sp>
+      <p:sp>
+        <p:nvSpPr>
+          <p:cNvPr id="3" name="Content Placeholder 2"/>
+          <p:cNvSpPr>
+            <a:spLocks noGrp="1"/>
+          </p:cNvSpPr>
+          <p:nvPr>
+            <p:ph idx="1"/>
+          </p:nvPr>
+        </p:nvSpPr>
+        <p:spPr>
+          <a:xfrm>
+            <a:off x="457199" y="1600200"/>
+            <a:ext cx="8480285" cy="5429200"/>
+          </a:xfrm>
+        </p:spPr>
+        <p:txBody>
+          <a:bodyPr>
+            <a:normAutofit/>
+          </a:bodyPr>
+          <a:lstStyle/>
+          <a:p>
+            <a:r>
+              <a:rPr lang="pt-BR" sz="2000" dirty="0" smtClean="0">
+                <a:solidFill>
+                  <a:schemeClr val="tx1">
+                    <a:lumMod val="75000"/>
+                    <a:lumOff val="25000"/>
+                  </a:schemeClr>
+                </a:solidFill>
+                <a:latin typeface="Calibri" panose="020F0502020204030204" pitchFamily="34" charset="0"/>
+              </a:rPr>
+              <a:t>Comparação dos resultados a partir dos  histogramas acumulados.</a:t>
+            </a:r>
+          </a:p>
+          <a:p>
+            <a:pPr marL="0" indent="0">
+              <a:buNone/>
+            </a:pPr>
             <a:endParaRPr lang="pt-BR" sz="2000" dirty="0" smtClean="0">
               <a:solidFill>
                 <a:schemeClr val="tx1">
@@ -4129,7 +4280,7 @@
           </a:p>
           <a:p>
             <a:r>
-              <a:rPr lang="pt-BR" sz="2000" dirty="0" smtClean="0">
+              <a:rPr lang="pt-BR" sz="2000" dirty="0" err="1" smtClean="0">
                 <a:solidFill>
                   <a:schemeClr val="tx1">
                     <a:lumMod val="75000"/>
@@ -4138,9 +4289,47 @@
                 </a:solidFill>
                 <a:latin typeface="Calibri" panose="020F0502020204030204" pitchFamily="34" charset="0"/>
               </a:rPr>
-              <a:t>Realçar as interfaces entre os diferentes materiais do volume.</a:t>
-            </a:r>
-            <a:endParaRPr lang="pt-BR" sz="1400" dirty="0">
+              <a:t>Kindlmamn</a:t>
+            </a:r>
+            <a:r>
+              <a:rPr lang="pt-BR" sz="2000" dirty="0" smtClean="0">
+                <a:solidFill>
+                  <a:schemeClr val="tx1">
+                    <a:lumMod val="75000"/>
+                    <a:lumOff val="25000"/>
+                  </a:schemeClr>
+                </a:solidFill>
+                <a:latin typeface="Calibri" panose="020F0502020204030204" pitchFamily="34" charset="0"/>
+              </a:rPr>
+              <a:t> e </a:t>
+            </a:r>
+            <a:r>
+              <a:rPr lang="pt-BR" sz="2000" dirty="0" err="1" smtClean="0">
+                <a:solidFill>
+                  <a:schemeClr val="tx1">
+                    <a:lumMod val="75000"/>
+                    <a:lumOff val="25000"/>
+                  </a:schemeClr>
+                </a:solidFill>
+                <a:latin typeface="Calibri" panose="020F0502020204030204" pitchFamily="34" charset="0"/>
+              </a:rPr>
+              <a:t>Durkin</a:t>
+            </a:r>
+            <a:r>
+              <a:rPr lang="pt-BR" sz="2000" dirty="0" smtClean="0">
+                <a:solidFill>
+                  <a:schemeClr val="tx1">
+                    <a:lumMod val="75000"/>
+                    <a:lumOff val="25000"/>
+                  </a:schemeClr>
+                </a:solidFill>
+                <a:latin typeface="Calibri" panose="020F0502020204030204" pitchFamily="34" charset="0"/>
+              </a:rPr>
+              <a:t>            f’                                                                                  f’’</a:t>
+            </a:r>
+          </a:p>
+          <a:p>
+            <a:endParaRPr lang="pt-BR" sz="2000" dirty="0">
               <a:solidFill>
                 <a:schemeClr val="tx1">
                   <a:lumMod val="75000"/>
@@ -4150,11 +4339,558 @@
               <a:latin typeface="Calibri" panose="020F0502020204030204" pitchFamily="34" charset="0"/>
             </a:endParaRPr>
           </a:p>
+          <a:p>
+            <a:endParaRPr lang="pt-BR" sz="2000" dirty="0" smtClean="0">
+              <a:solidFill>
+                <a:schemeClr val="tx1">
+                  <a:lumMod val="75000"/>
+                  <a:lumOff val="25000"/>
+                </a:schemeClr>
+              </a:solidFill>
+              <a:latin typeface="Calibri" panose="020F0502020204030204" pitchFamily="34" charset="0"/>
+            </a:endParaRPr>
+          </a:p>
+          <a:p>
+            <a:endParaRPr lang="pt-BR" sz="2000" dirty="0">
+              <a:solidFill>
+                <a:schemeClr val="tx1">
+                  <a:lumMod val="75000"/>
+                  <a:lumOff val="25000"/>
+                </a:schemeClr>
+              </a:solidFill>
+              <a:latin typeface="Calibri" panose="020F0502020204030204" pitchFamily="34" charset="0"/>
+            </a:endParaRPr>
+          </a:p>
+          <a:p>
+            <a:pPr marL="0" indent="0">
+              <a:buNone/>
+            </a:pPr>
+            <a:endParaRPr lang="pt-BR" sz="800" dirty="0" smtClean="0">
+              <a:solidFill>
+                <a:schemeClr val="tx1">
+                  <a:lumMod val="75000"/>
+                  <a:lumOff val="25000"/>
+                </a:schemeClr>
+              </a:solidFill>
+              <a:latin typeface="Calibri" panose="020F0502020204030204" pitchFamily="34" charset="0"/>
+            </a:endParaRPr>
+          </a:p>
+          <a:p>
+            <a:pPr marL="0" indent="0">
+              <a:buNone/>
+            </a:pPr>
+            <a:r>
+              <a:rPr lang="pt-BR" sz="2000" dirty="0" smtClean="0">
+                <a:solidFill>
+                  <a:schemeClr val="tx1">
+                    <a:lumMod val="75000"/>
+                    <a:lumOff val="25000"/>
+                  </a:schemeClr>
+                </a:solidFill>
+                <a:latin typeface="Calibri" panose="020F0502020204030204" pitchFamily="34" charset="0"/>
+              </a:rPr>
+              <a:t>                                                                             f                                         </a:t>
+            </a:r>
+            <a:r>
+              <a:rPr lang="pt-BR" sz="2000" dirty="0" err="1" smtClean="0">
+                <a:solidFill>
+                  <a:schemeClr val="tx1">
+                    <a:lumMod val="75000"/>
+                    <a:lumOff val="25000"/>
+                  </a:schemeClr>
+                </a:solidFill>
+                <a:latin typeface="Calibri" panose="020F0502020204030204" pitchFamily="34" charset="0"/>
+              </a:rPr>
+              <a:t>f</a:t>
+            </a:r>
+            <a:endParaRPr lang="pt-BR" sz="2000" dirty="0" smtClean="0">
+              <a:solidFill>
+                <a:schemeClr val="tx1">
+                  <a:lumMod val="75000"/>
+                  <a:lumOff val="25000"/>
+                </a:schemeClr>
+              </a:solidFill>
+              <a:latin typeface="Calibri" panose="020F0502020204030204" pitchFamily="34" charset="0"/>
+            </a:endParaRPr>
+          </a:p>
+          <a:p>
+            <a:endParaRPr lang="pt-BR" sz="2000" dirty="0" smtClean="0">
+              <a:solidFill>
+                <a:schemeClr val="tx1">
+                  <a:lumMod val="75000"/>
+                  <a:lumOff val="25000"/>
+                </a:schemeClr>
+              </a:solidFill>
+              <a:latin typeface="Calibri" panose="020F0502020204030204" pitchFamily="34" charset="0"/>
+            </a:endParaRPr>
+          </a:p>
+          <a:p>
+            <a:r>
+              <a:rPr lang="pt-BR" sz="2000" dirty="0" smtClean="0">
+                <a:solidFill>
+                  <a:schemeClr val="tx1">
+                    <a:lumMod val="75000"/>
+                    <a:lumOff val="25000"/>
+                  </a:schemeClr>
+                </a:solidFill>
+                <a:latin typeface="Calibri" panose="020F0502020204030204" pitchFamily="34" charset="0"/>
+              </a:rPr>
+              <a:t>Estado da arte.                      f’                                                                                  f’’</a:t>
+            </a:r>
+          </a:p>
+          <a:p>
+            <a:endParaRPr lang="pt-BR" sz="2000" dirty="0">
+              <a:solidFill>
+                <a:schemeClr val="tx1">
+                  <a:lumMod val="75000"/>
+                  <a:lumOff val="25000"/>
+                </a:schemeClr>
+              </a:solidFill>
+              <a:latin typeface="Calibri" panose="020F0502020204030204" pitchFamily="34" charset="0"/>
+            </a:endParaRPr>
+          </a:p>
+          <a:p>
+            <a:endParaRPr lang="pt-BR" sz="2000" dirty="0" smtClean="0">
+              <a:solidFill>
+                <a:schemeClr val="tx1">
+                  <a:lumMod val="75000"/>
+                  <a:lumOff val="25000"/>
+                </a:schemeClr>
+              </a:solidFill>
+              <a:latin typeface="Calibri" panose="020F0502020204030204" pitchFamily="34" charset="0"/>
+            </a:endParaRPr>
+          </a:p>
+          <a:p>
+            <a:pPr marL="0" indent="0">
+              <a:buNone/>
+            </a:pPr>
+            <a:endParaRPr lang="pt-BR" sz="2000" dirty="0" smtClean="0">
+              <a:solidFill>
+                <a:schemeClr val="tx1">
+                  <a:lumMod val="75000"/>
+                  <a:lumOff val="25000"/>
+                </a:schemeClr>
+              </a:solidFill>
+              <a:latin typeface="Calibri" panose="020F0502020204030204" pitchFamily="34" charset="0"/>
+            </a:endParaRPr>
+          </a:p>
+          <a:p>
+            <a:pPr marL="0" indent="0">
+              <a:buNone/>
+            </a:pPr>
+            <a:endParaRPr lang="pt-BR" sz="2000" dirty="0" smtClean="0">
+              <a:solidFill>
+                <a:schemeClr val="tx1">
+                  <a:lumMod val="75000"/>
+                  <a:lumOff val="25000"/>
+                </a:schemeClr>
+              </a:solidFill>
+              <a:latin typeface="Calibri" panose="020F0502020204030204" pitchFamily="34" charset="0"/>
+            </a:endParaRPr>
+          </a:p>
+          <a:p>
+            <a:pPr marL="0" indent="0">
+              <a:buNone/>
+            </a:pPr>
+            <a:r>
+              <a:rPr lang="pt-BR" sz="2000" dirty="0">
+                <a:solidFill>
+                  <a:schemeClr val="tx1">
+                    <a:lumMod val="75000"/>
+                    <a:lumOff val="25000"/>
+                  </a:schemeClr>
+                </a:solidFill>
+                <a:latin typeface="Calibri" panose="020F0502020204030204" pitchFamily="34" charset="0"/>
+              </a:rPr>
+              <a:t> </a:t>
+            </a:r>
+            <a:r>
+              <a:rPr lang="pt-BR" sz="2000" dirty="0" smtClean="0">
+                <a:solidFill>
+                  <a:schemeClr val="tx1">
+                    <a:lumMod val="75000"/>
+                    <a:lumOff val="25000"/>
+                  </a:schemeClr>
+                </a:solidFill>
+                <a:latin typeface="Calibri" panose="020F0502020204030204" pitchFamily="34" charset="0"/>
+              </a:rPr>
+              <a:t>                                                                             f                                       </a:t>
+            </a:r>
+            <a:r>
+              <a:rPr lang="pt-BR" sz="2000" dirty="0" err="1" smtClean="0">
+                <a:solidFill>
+                  <a:schemeClr val="tx1">
+                    <a:lumMod val="75000"/>
+                    <a:lumOff val="25000"/>
+                  </a:schemeClr>
+                </a:solidFill>
+                <a:latin typeface="Calibri" panose="020F0502020204030204" pitchFamily="34" charset="0"/>
+              </a:rPr>
+              <a:t>f</a:t>
+            </a:r>
+            <a:endParaRPr lang="pt-BR" sz="2000" dirty="0" smtClean="0">
+              <a:solidFill>
+                <a:schemeClr val="tx1">
+                  <a:lumMod val="75000"/>
+                  <a:lumOff val="25000"/>
+                </a:schemeClr>
+              </a:solidFill>
+              <a:latin typeface="Calibri" panose="020F0502020204030204" pitchFamily="34" charset="0"/>
+            </a:endParaRPr>
+          </a:p>
         </p:txBody>
       </p:sp>
       <p:pic>
         <p:nvPicPr>
           <p:cNvPr id="5" name="Imagem 4"/>
+          <p:cNvPicPr/>
+          <p:nvPr/>
+        </p:nvPicPr>
+        <p:blipFill>
+          <a:blip r:embed="rId2">
+            <a:extLst>
+              <a:ext uri="{28A0092B-C50C-407E-A947-70E740481C1C}">
+                <a14:useLocalDpi xmlns:a14="http://schemas.microsoft.com/office/drawing/2010/main" val="0"/>
+              </a:ext>
+            </a:extLst>
+          </a:blip>
+          <a:stretch>
+            <a:fillRect/>
+          </a:stretch>
+        </p:blipFill>
+        <p:spPr>
+          <a:xfrm>
+            <a:off x="3875094" y="2303875"/>
+            <a:ext cx="4612341" cy="1659511"/>
+          </a:xfrm>
+          <a:prstGeom prst="rect">
+            <a:avLst/>
+          </a:prstGeom>
+        </p:spPr>
+      </p:pic>
+      <p:pic>
+        <p:nvPicPr>
+          <p:cNvPr id="6" name="Imagem 5"/>
+          <p:cNvPicPr/>
+          <p:nvPr/>
+        </p:nvPicPr>
+        <p:blipFill>
+          <a:blip r:embed="rId3">
+            <a:extLst>
+              <a:ext uri="{28A0092B-C50C-407E-A947-70E740481C1C}">
+                <a14:useLocalDpi xmlns:a14="http://schemas.microsoft.com/office/drawing/2010/main" val="0"/>
+              </a:ext>
+            </a:extLst>
+          </a:blip>
+          <a:stretch>
+            <a:fillRect/>
+          </a:stretch>
+        </p:blipFill>
+        <p:spPr>
+          <a:xfrm>
+            <a:off x="3917185" y="4807750"/>
+            <a:ext cx="2212547" cy="1591580"/>
+          </a:xfrm>
+          <a:prstGeom prst="rect">
+            <a:avLst/>
+          </a:prstGeom>
+          <a:ln w="38100" cap="sq">
+            <a:solidFill>
+              <a:srgbClr val="000000"/>
+            </a:solidFill>
+            <a:prstDash val="solid"/>
+            <a:miter lim="800000"/>
+          </a:ln>
+          <a:effectLst>
+            <a:outerShdw blurRad="50800" dist="38100" dir="2700000" algn="tl" rotWithShape="0">
+              <a:srgbClr val="000000">
+                <a:alpha val="43000"/>
+              </a:srgbClr>
+            </a:outerShdw>
+          </a:effectLst>
+        </p:spPr>
+      </p:pic>
+      <p:pic>
+        <p:nvPicPr>
+          <p:cNvPr id="7" name="Imagem 6"/>
+          <p:cNvPicPr/>
+          <p:nvPr/>
+        </p:nvPicPr>
+        <p:blipFill>
+          <a:blip r:embed="rId4">
+            <a:extLst>
+              <a:ext uri="{28A0092B-C50C-407E-A947-70E740481C1C}">
+                <a14:useLocalDpi xmlns:a14="http://schemas.microsoft.com/office/drawing/2010/main" val="0"/>
+              </a:ext>
+            </a:extLst>
+          </a:blip>
+          <a:stretch>
+            <a:fillRect/>
+          </a:stretch>
+        </p:blipFill>
+        <p:spPr>
+          <a:xfrm>
+            <a:off x="6219742" y="4807750"/>
+            <a:ext cx="2202513" cy="1591580"/>
+          </a:xfrm>
+          <a:prstGeom prst="rect">
+            <a:avLst/>
+          </a:prstGeom>
+          <a:ln w="38100" cap="sq">
+            <a:solidFill>
+              <a:srgbClr val="000000"/>
+            </a:solidFill>
+            <a:prstDash val="solid"/>
+            <a:miter lim="800000"/>
+          </a:ln>
+          <a:effectLst>
+            <a:outerShdw blurRad="50800" dist="38100" dir="2700000" algn="tl" rotWithShape="0">
+              <a:srgbClr val="000000">
+                <a:alpha val="43000"/>
+              </a:srgbClr>
+            </a:outerShdw>
+          </a:effectLst>
+        </p:spPr>
+      </p:pic>
+    </p:spTree>
+    <p:extLst>
+      <p:ext uri="{BB962C8B-B14F-4D97-AF65-F5344CB8AC3E}">
+        <p14:creationId xmlns:p14="http://schemas.microsoft.com/office/powerpoint/2010/main" val="1990654920"/>
+      </p:ext>
+    </p:extLst>
+  </p:cSld>
+  <p:clrMapOvr>
+    <a:masterClrMapping/>
+  </p:clrMapOvr>
+  <p:timing>
+    <p:tnLst>
+      <p:par>
+        <p:cTn id="1" dur="indefinite" restart="never" nodeType="tmRoot"/>
+      </p:par>
+    </p:tnLst>
+  </p:timing>
+</p:sld>
+</file>
+
+<file path=ppt/slides/slide12.xml><?xml version="1.0" encoding="utf-8"?>
+<p:sld xmlns:a="http://schemas.openxmlformats.org/drawingml/2006/main" xmlns:r="http://schemas.openxmlformats.org/officeDocument/2006/relationships" xmlns:p="http://schemas.openxmlformats.org/presentationml/2006/main">
+  <p:cSld>
+    <p:spTree>
+      <p:nvGrpSpPr>
+        <p:cNvPr id="1" name=""/>
+        <p:cNvGrpSpPr/>
+        <p:nvPr/>
+      </p:nvGrpSpPr>
+      <p:grpSpPr>
+        <a:xfrm>
+          <a:off x="0" y="0"/>
+          <a:ext cx="0" cy="0"/>
+          <a:chOff x="0" y="0"/>
+          <a:chExt cx="0" cy="0"/>
+        </a:xfrm>
+      </p:grpSpPr>
+      <p:sp>
+        <p:nvSpPr>
+          <p:cNvPr id="2" name="Title 1"/>
+          <p:cNvSpPr>
+            <a:spLocks noGrp="1"/>
+          </p:cNvSpPr>
+          <p:nvPr>
+            <p:ph type="title"/>
+          </p:nvPr>
+        </p:nvSpPr>
+        <p:spPr/>
+        <p:txBody>
+          <a:bodyPr anchor="ctr"/>
+          <a:lstStyle/>
+          <a:p>
+            <a:r>
+              <a:rPr lang="en-US" sz="4400" dirty="0" err="1" smtClean="0">
+                <a:latin typeface="Calibri" panose="020F0502020204030204" pitchFamily="34" charset="0"/>
+              </a:rPr>
+              <a:t>Resultados</a:t>
+            </a:r>
+            <a:endParaRPr lang="pt-BR" sz="4400" dirty="0"/>
+          </a:p>
+        </p:txBody>
+      </p:sp>
+      <p:pic>
+        <p:nvPicPr>
+          <p:cNvPr id="10" name="Imagem 9"/>
+          <p:cNvPicPr/>
+          <p:nvPr/>
+        </p:nvPicPr>
+        <p:blipFill>
+          <a:blip r:embed="rId2">
+            <a:extLst>
+              <a:ext uri="{28A0092B-C50C-407E-A947-70E740481C1C}">
+                <a14:useLocalDpi xmlns:a14="http://schemas.microsoft.com/office/drawing/2010/main" val="0"/>
+              </a:ext>
+            </a:extLst>
+          </a:blip>
+          <a:stretch>
+            <a:fillRect/>
+          </a:stretch>
+        </p:blipFill>
+        <p:spPr>
+          <a:xfrm>
+            <a:off x="1621458" y="1847731"/>
+            <a:ext cx="2573731" cy="1693785"/>
+          </a:xfrm>
+          <a:prstGeom prst="rect">
+            <a:avLst/>
+          </a:prstGeom>
+        </p:spPr>
+      </p:pic>
+      <p:pic>
+        <p:nvPicPr>
+          <p:cNvPr id="11" name="Imagem 10"/>
+          <p:cNvPicPr/>
+          <p:nvPr/>
+        </p:nvPicPr>
+        <p:blipFill>
+          <a:blip r:embed="rId3">
+            <a:extLst>
+              <a:ext uri="{28A0092B-C50C-407E-A947-70E740481C1C}">
+                <a14:useLocalDpi xmlns:a14="http://schemas.microsoft.com/office/drawing/2010/main" val="0"/>
+              </a:ext>
+            </a:extLst>
+          </a:blip>
+          <a:stretch>
+            <a:fillRect/>
+          </a:stretch>
+        </p:blipFill>
+        <p:spPr>
+          <a:xfrm>
+            <a:off x="5472100" y="1812802"/>
+            <a:ext cx="1506752" cy="1710190"/>
+          </a:xfrm>
+          <a:prstGeom prst="rect">
+            <a:avLst/>
+          </a:prstGeom>
+        </p:spPr>
+      </p:pic>
+      <p:pic>
+        <p:nvPicPr>
+          <p:cNvPr id="12" name="Imagem 11"/>
+          <p:cNvPicPr/>
+          <p:nvPr/>
+        </p:nvPicPr>
+        <p:blipFill>
+          <a:blip r:embed="rId4">
+            <a:extLst>
+              <a:ext uri="{28A0092B-C50C-407E-A947-70E740481C1C}">
+                <a14:useLocalDpi xmlns:a14="http://schemas.microsoft.com/office/drawing/2010/main" val="0"/>
+              </a:ext>
+            </a:extLst>
+          </a:blip>
+          <a:stretch>
+            <a:fillRect/>
+          </a:stretch>
+        </p:blipFill>
+        <p:spPr>
+          <a:xfrm>
+            <a:off x="1151620" y="4097916"/>
+            <a:ext cx="3209290" cy="2059305"/>
+          </a:xfrm>
+          <a:prstGeom prst="rect">
+            <a:avLst/>
+          </a:prstGeom>
+        </p:spPr>
+      </p:pic>
+      <p:pic>
+        <p:nvPicPr>
+          <p:cNvPr id="13" name="Imagem 12"/>
+          <p:cNvPicPr/>
+          <p:nvPr/>
+        </p:nvPicPr>
+        <p:blipFill>
+          <a:blip r:embed="rId5">
+            <a:extLst>
+              <a:ext uri="{28A0092B-C50C-407E-A947-70E740481C1C}">
+                <a14:useLocalDpi xmlns:a14="http://schemas.microsoft.com/office/drawing/2010/main" val="0"/>
+              </a:ext>
+            </a:extLst>
+          </a:blip>
+          <a:stretch>
+            <a:fillRect/>
+          </a:stretch>
+        </p:blipFill>
+        <p:spPr>
+          <a:xfrm>
+            <a:off x="5112060" y="3823993"/>
+            <a:ext cx="2533373" cy="2607152"/>
+          </a:xfrm>
+          <a:prstGeom prst="rect">
+            <a:avLst/>
+          </a:prstGeom>
+        </p:spPr>
+      </p:pic>
+    </p:spTree>
+    <p:extLst>
+      <p:ext uri="{BB962C8B-B14F-4D97-AF65-F5344CB8AC3E}">
+        <p14:creationId xmlns:p14="http://schemas.microsoft.com/office/powerpoint/2010/main" val="211085580"/>
+      </p:ext>
+    </p:extLst>
+  </p:cSld>
+  <p:clrMapOvr>
+    <a:masterClrMapping/>
+  </p:clrMapOvr>
+  <p:timing>
+    <p:tnLst>
+      <p:par>
+        <p:cTn id="1" dur="indefinite" restart="never" nodeType="tmRoot"/>
+      </p:par>
+    </p:tnLst>
+  </p:timing>
+</p:sld>
+</file>
+
+<file path=ppt/slides/slide13.xml><?xml version="1.0" encoding="utf-8"?>
+<p:sld xmlns:a="http://schemas.openxmlformats.org/drawingml/2006/main" xmlns:r="http://schemas.openxmlformats.org/officeDocument/2006/relationships" xmlns:p="http://schemas.openxmlformats.org/presentationml/2006/main">
+  <p:cSld>
+    <p:spTree>
+      <p:nvGrpSpPr>
+        <p:cNvPr id="1" name=""/>
+        <p:cNvGrpSpPr/>
+        <p:nvPr/>
+      </p:nvGrpSpPr>
+      <p:grpSpPr>
+        <a:xfrm>
+          <a:off x="0" y="0"/>
+          <a:ext cx="0" cy="0"/>
+          <a:chOff x="0" y="0"/>
+          <a:chExt cx="0" cy="0"/>
+        </a:xfrm>
+      </p:grpSpPr>
+      <p:sp>
+        <p:nvSpPr>
+          <p:cNvPr id="2" name="Title 1"/>
+          <p:cNvSpPr>
+            <a:spLocks noGrp="1"/>
+          </p:cNvSpPr>
+          <p:nvPr>
+            <p:ph type="title"/>
+          </p:nvPr>
+        </p:nvSpPr>
+        <p:spPr/>
+        <p:txBody>
+          <a:bodyPr anchor="ctr"/>
+          <a:lstStyle/>
+          <a:p>
+            <a:r>
+              <a:rPr lang="en-US" sz="4400" dirty="0" err="1" smtClean="0">
+                <a:latin typeface="Calibri" panose="020F0502020204030204" pitchFamily="34" charset="0"/>
+              </a:rPr>
+              <a:t>Resultados</a:t>
+            </a:r>
+            <a:endParaRPr lang="pt-BR" sz="4400" dirty="0"/>
+          </a:p>
+        </p:txBody>
+      </p:sp>
+      <p:pic>
+        <p:nvPicPr>
+          <p:cNvPr id="3" name="Imagem 2"/>
           <p:cNvPicPr>
             <a:picLocks noChangeAspect="1"/>
           </p:cNvPicPr>
@@ -4174,8 +4910,645 @@
         </p:blipFill>
         <p:spPr>
           <a:xfrm>
-            <a:off x="2906815" y="2933944"/>
-            <a:ext cx="3171301" cy="3015335"/>
+            <a:off x="1960116" y="1600200"/>
+            <a:ext cx="5258534" cy="4363059"/>
+          </a:xfrm>
+          <a:prstGeom prst="rect">
+            <a:avLst/>
+          </a:prstGeom>
+        </p:spPr>
+      </p:pic>
+    </p:spTree>
+    <p:extLst>
+      <p:ext uri="{BB962C8B-B14F-4D97-AF65-F5344CB8AC3E}">
+        <p14:creationId xmlns:p14="http://schemas.microsoft.com/office/powerpoint/2010/main" val="1330673688"/>
+      </p:ext>
+    </p:extLst>
+  </p:cSld>
+  <p:clrMapOvr>
+    <a:masterClrMapping/>
+  </p:clrMapOvr>
+  <p:timing>
+    <p:tnLst>
+      <p:par>
+        <p:cTn id="1" dur="indefinite" restart="never" nodeType="tmRoot"/>
+      </p:par>
+    </p:tnLst>
+  </p:timing>
+</p:sld>
+</file>
+
+<file path=ppt/slides/slide14.xml><?xml version="1.0" encoding="utf-8"?>
+<p:sld xmlns:a="http://schemas.openxmlformats.org/drawingml/2006/main" xmlns:r="http://schemas.openxmlformats.org/officeDocument/2006/relationships" xmlns:p="http://schemas.openxmlformats.org/presentationml/2006/main">
+  <p:cSld>
+    <p:spTree>
+      <p:nvGrpSpPr>
+        <p:cNvPr id="1" name=""/>
+        <p:cNvGrpSpPr/>
+        <p:nvPr/>
+      </p:nvGrpSpPr>
+      <p:grpSpPr>
+        <a:xfrm>
+          <a:off x="0" y="0"/>
+          <a:ext cx="0" cy="0"/>
+          <a:chOff x="0" y="0"/>
+          <a:chExt cx="0" cy="0"/>
+        </a:xfrm>
+      </p:grpSpPr>
+      <p:sp>
+        <p:nvSpPr>
+          <p:cNvPr id="2" name="Title 1"/>
+          <p:cNvSpPr>
+            <a:spLocks noGrp="1"/>
+          </p:cNvSpPr>
+          <p:nvPr>
+            <p:ph type="title"/>
+          </p:nvPr>
+        </p:nvSpPr>
+        <p:spPr/>
+        <p:txBody>
+          <a:bodyPr anchor="ctr"/>
+          <a:lstStyle/>
+          <a:p>
+            <a:r>
+              <a:rPr lang="en-US" sz="4400" dirty="0" err="1" smtClean="0">
+                <a:latin typeface="Calibri" panose="020F0502020204030204" pitchFamily="34" charset="0"/>
+              </a:rPr>
+              <a:t>Continuidade</a:t>
+            </a:r>
+            <a:r>
+              <a:rPr lang="en-US" sz="4400" dirty="0" smtClean="0">
+                <a:latin typeface="Calibri" panose="020F0502020204030204" pitchFamily="34" charset="0"/>
+              </a:rPr>
+              <a:t> da </a:t>
+            </a:r>
+            <a:r>
+              <a:rPr lang="en-US" sz="4400" dirty="0" err="1" smtClean="0">
+                <a:latin typeface="Calibri" panose="020F0502020204030204" pitchFamily="34" charset="0"/>
+              </a:rPr>
+              <a:t>Pesquisa</a:t>
+            </a:r>
+            <a:endParaRPr lang="pt-BR" sz="4400" dirty="0"/>
+          </a:p>
+        </p:txBody>
+      </p:sp>
+      <p:sp>
+        <p:nvSpPr>
+          <p:cNvPr id="5" name="Espaço Reservado para Conteúdo 4"/>
+          <p:cNvSpPr>
+            <a:spLocks noGrp="1"/>
+          </p:cNvSpPr>
+          <p:nvPr>
+            <p:ph idx="1"/>
+          </p:nvPr>
+        </p:nvSpPr>
+        <p:spPr/>
+        <p:txBody>
+          <a:bodyPr/>
+          <a:lstStyle/>
+          <a:p>
+            <a:endParaRPr lang="pt-BR" dirty="0" smtClean="0"/>
+          </a:p>
+          <a:p>
+            <a:endParaRPr lang="pt-BR" dirty="0"/>
+          </a:p>
+          <a:p>
+            <a:r>
+              <a:rPr lang="pt-BR" sz="2000" dirty="0" smtClean="0">
+                <a:solidFill>
+                  <a:schemeClr val="tx1">
+                    <a:lumMod val="75000"/>
+                    <a:lumOff val="25000"/>
+                  </a:schemeClr>
+                </a:solidFill>
+                <a:latin typeface="Calibri" panose="020F0502020204030204" pitchFamily="34" charset="0"/>
+              </a:rPr>
+              <a:t>Resolver os problema detectados.</a:t>
+            </a:r>
+          </a:p>
+          <a:p>
+            <a:r>
+              <a:rPr lang="pt-BR" sz="2000" dirty="0" smtClean="0">
+                <a:solidFill>
+                  <a:schemeClr val="tx1">
+                    <a:lumMod val="75000"/>
+                    <a:lumOff val="25000"/>
+                  </a:schemeClr>
+                </a:solidFill>
+                <a:latin typeface="Calibri" panose="020F0502020204030204" pitchFamily="34" charset="0"/>
+              </a:rPr>
+              <a:t>Estudar aplicação em dados de reservatório.</a:t>
+            </a:r>
+            <a:endParaRPr lang="pt-BR" sz="2000" dirty="0">
+              <a:solidFill>
+                <a:schemeClr val="tx1">
+                  <a:lumMod val="75000"/>
+                  <a:lumOff val="25000"/>
+                </a:schemeClr>
+              </a:solidFill>
+              <a:latin typeface="Calibri" panose="020F0502020204030204" pitchFamily="34" charset="0"/>
+            </a:endParaRPr>
+          </a:p>
+        </p:txBody>
+      </p:sp>
+    </p:spTree>
+    <p:extLst>
+      <p:ext uri="{BB962C8B-B14F-4D97-AF65-F5344CB8AC3E}">
+        <p14:creationId xmlns:p14="http://schemas.microsoft.com/office/powerpoint/2010/main" val="969864519"/>
+      </p:ext>
+    </p:extLst>
+  </p:cSld>
+  <p:clrMapOvr>
+    <a:masterClrMapping/>
+  </p:clrMapOvr>
+  <p:timing>
+    <p:tnLst>
+      <p:par>
+        <p:cTn id="1" dur="indefinite" restart="never" nodeType="tmRoot"/>
+      </p:par>
+    </p:tnLst>
+  </p:timing>
+</p:sld>
+</file>
+
+<file path=ppt/slides/slide15.xml><?xml version="1.0" encoding="utf-8"?>
+<p:sld xmlns:a="http://schemas.openxmlformats.org/drawingml/2006/main" xmlns:r="http://schemas.openxmlformats.org/officeDocument/2006/relationships" xmlns:p="http://schemas.openxmlformats.org/presentationml/2006/main">
+  <p:cSld>
+    <p:spTree>
+      <p:nvGrpSpPr>
+        <p:cNvPr id="1" name=""/>
+        <p:cNvGrpSpPr/>
+        <p:nvPr/>
+      </p:nvGrpSpPr>
+      <p:grpSpPr>
+        <a:xfrm>
+          <a:off x="0" y="0"/>
+          <a:ext cx="0" cy="0"/>
+          <a:chOff x="0" y="0"/>
+          <a:chExt cx="0" cy="0"/>
+        </a:xfrm>
+      </p:grpSpPr>
+      <p:sp>
+        <p:nvSpPr>
+          <p:cNvPr id="4" name="Título 3"/>
+          <p:cNvSpPr>
+            <a:spLocks noGrp="1"/>
+          </p:cNvSpPr>
+          <p:nvPr>
+            <p:ph type="title"/>
+          </p:nvPr>
+        </p:nvSpPr>
+        <p:spPr/>
+        <p:txBody>
+          <a:bodyPr/>
+          <a:lstStyle/>
+          <a:p>
+            <a:r>
+              <a:rPr lang="pt-BR" sz="4400" dirty="0" smtClean="0"/>
+              <a:t>Dúvidas?</a:t>
+            </a:r>
+            <a:endParaRPr lang="pt-BR" sz="4400" dirty="0"/>
+          </a:p>
+        </p:txBody>
+      </p:sp>
+      <p:sp>
+        <p:nvSpPr>
+          <p:cNvPr id="7" name="Retângulo 6"/>
+          <p:cNvSpPr/>
+          <p:nvPr/>
+        </p:nvSpPr>
+        <p:spPr>
+          <a:xfrm>
+            <a:off x="3206882" y="5904275"/>
+            <a:ext cx="2730235" cy="369332"/>
+          </a:xfrm>
+          <a:prstGeom prst="rect">
+            <a:avLst/>
+          </a:prstGeom>
+        </p:spPr>
+        <p:txBody>
+          <a:bodyPr wrap="none">
+            <a:spAutoFit/>
+          </a:bodyPr>
+          <a:lstStyle/>
+          <a:p>
+            <a:r>
+              <a:rPr lang="pt-BR" dirty="0" smtClean="0">
+                <a:solidFill>
+                  <a:schemeClr val="accent1">
+                    <a:lumMod val="50000"/>
+                  </a:schemeClr>
+                </a:solidFill>
+              </a:rPr>
+              <a:t>rmesquita@inf.puc-rio.br</a:t>
+            </a:r>
+            <a:endParaRPr lang="pt-BR" dirty="0">
+              <a:solidFill>
+                <a:schemeClr val="accent1">
+                  <a:lumMod val="50000"/>
+                </a:schemeClr>
+              </a:solidFill>
+            </a:endParaRPr>
+          </a:p>
+        </p:txBody>
+      </p:sp>
+    </p:spTree>
+    <p:extLst>
+      <p:ext uri="{BB962C8B-B14F-4D97-AF65-F5344CB8AC3E}">
+        <p14:creationId xmlns:p14="http://schemas.microsoft.com/office/powerpoint/2010/main" val="2453807565"/>
+      </p:ext>
+    </p:extLst>
+  </p:cSld>
+  <p:clrMapOvr>
+    <a:masterClrMapping/>
+  </p:clrMapOvr>
+  <p:timing>
+    <p:tnLst>
+      <p:par>
+        <p:cTn id="1" dur="indefinite" restart="never" nodeType="tmRoot"/>
+      </p:par>
+    </p:tnLst>
+  </p:timing>
+</p:sld>
+</file>
+
+<file path=ppt/slides/slide2.xml><?xml version="1.0" encoding="utf-8"?>
+<p:sld xmlns:a="http://schemas.openxmlformats.org/drawingml/2006/main" xmlns:r="http://schemas.openxmlformats.org/officeDocument/2006/relationships" xmlns:p="http://schemas.openxmlformats.org/presentationml/2006/main">
+  <p:cSld>
+    <p:spTree>
+      <p:nvGrpSpPr>
+        <p:cNvPr id="1" name=""/>
+        <p:cNvGrpSpPr/>
+        <p:nvPr/>
+      </p:nvGrpSpPr>
+      <p:grpSpPr>
+        <a:xfrm>
+          <a:off x="0" y="0"/>
+          <a:ext cx="0" cy="0"/>
+          <a:chOff x="0" y="0"/>
+          <a:chExt cx="0" cy="0"/>
+        </a:xfrm>
+      </p:grpSpPr>
+      <p:sp>
+        <p:nvSpPr>
+          <p:cNvPr id="2" name="Title 1"/>
+          <p:cNvSpPr>
+            <a:spLocks noGrp="1"/>
+          </p:cNvSpPr>
+          <p:nvPr>
+            <p:ph type="title"/>
+          </p:nvPr>
+        </p:nvSpPr>
+        <p:spPr/>
+        <p:txBody>
+          <a:bodyPr anchor="ctr"/>
+          <a:lstStyle/>
+          <a:p>
+            <a:r>
+              <a:rPr lang="en-US" sz="4400" dirty="0" err="1" smtClean="0">
+                <a:latin typeface="Calibri" panose="020F0502020204030204" pitchFamily="34" charset="0"/>
+              </a:rPr>
+              <a:t>Introdução</a:t>
+            </a:r>
+            <a:endParaRPr lang="pt-BR" sz="4400" dirty="0"/>
+          </a:p>
+        </p:txBody>
+      </p:sp>
+      <p:sp>
+        <p:nvSpPr>
+          <p:cNvPr id="3" name="Content Placeholder 2"/>
+          <p:cNvSpPr>
+            <a:spLocks noGrp="1"/>
+          </p:cNvSpPr>
+          <p:nvPr>
+            <p:ph idx="1"/>
+          </p:nvPr>
+        </p:nvSpPr>
+        <p:spPr/>
+        <p:txBody>
+          <a:bodyPr>
+            <a:normAutofit/>
+          </a:bodyPr>
+          <a:lstStyle/>
+          <a:p>
+            <a:r>
+              <a:rPr lang="pt-BR" sz="2000" dirty="0" smtClean="0">
+                <a:solidFill>
+                  <a:schemeClr val="tx1">
+                    <a:lumMod val="75000"/>
+                    <a:lumOff val="25000"/>
+                  </a:schemeClr>
+                </a:solidFill>
+                <a:latin typeface="Calibri" panose="020F0502020204030204" pitchFamily="34" charset="0"/>
+              </a:rPr>
+              <a:t>Função de Transferência: associa propriedade óptica a um valor de </a:t>
+            </a:r>
+            <a:r>
+              <a:rPr lang="pt-BR" sz="2000" dirty="0" err="1" smtClean="0">
+                <a:solidFill>
+                  <a:schemeClr val="tx1">
+                    <a:lumMod val="75000"/>
+                    <a:lumOff val="25000"/>
+                  </a:schemeClr>
+                </a:solidFill>
+                <a:latin typeface="Calibri" panose="020F0502020204030204" pitchFamily="34" charset="0"/>
+              </a:rPr>
+              <a:t>voxel</a:t>
+            </a:r>
+            <a:r>
+              <a:rPr lang="pt-BR" sz="2000" dirty="0" smtClean="0">
+                <a:solidFill>
+                  <a:schemeClr val="tx1">
+                    <a:lumMod val="75000"/>
+                    <a:lumOff val="25000"/>
+                  </a:schemeClr>
+                </a:solidFill>
+                <a:latin typeface="Calibri" panose="020F0502020204030204" pitchFamily="34" charset="0"/>
+              </a:rPr>
+              <a:t>.</a:t>
+            </a:r>
+            <a:endParaRPr lang="pt-BR" sz="2000" dirty="0" smtClean="0">
+              <a:solidFill>
+                <a:schemeClr val="tx1">
+                  <a:lumMod val="75000"/>
+                  <a:lumOff val="25000"/>
+                </a:schemeClr>
+              </a:solidFill>
+              <a:latin typeface="Calibri" panose="020F0502020204030204" pitchFamily="34" charset="0"/>
+            </a:endParaRPr>
+          </a:p>
+          <a:p>
+            <a:r>
+              <a:rPr lang="pt-BR" sz="2000" dirty="0" smtClean="0">
+                <a:solidFill>
+                  <a:schemeClr val="tx1">
+                    <a:lumMod val="75000"/>
+                    <a:lumOff val="25000"/>
+                  </a:schemeClr>
+                </a:solidFill>
+                <a:latin typeface="Calibri" panose="020F0502020204030204" pitchFamily="34" charset="0"/>
+              </a:rPr>
+              <a:t>Realçar as interfaces entre os diferentes materiais </a:t>
+            </a:r>
+            <a:r>
+              <a:rPr lang="pt-BR" sz="2000" dirty="0" smtClean="0">
+                <a:solidFill>
+                  <a:schemeClr val="tx1">
+                    <a:lumMod val="75000"/>
+                    <a:lumOff val="25000"/>
+                  </a:schemeClr>
+                </a:solidFill>
+                <a:latin typeface="Calibri" panose="020F0502020204030204" pitchFamily="34" charset="0"/>
+              </a:rPr>
+              <a:t>de um </a:t>
+            </a:r>
+            <a:r>
+              <a:rPr lang="pt-BR" sz="2000" dirty="0" smtClean="0">
+                <a:solidFill>
+                  <a:schemeClr val="tx1">
+                    <a:lumMod val="75000"/>
+                    <a:lumOff val="25000"/>
+                  </a:schemeClr>
+                </a:solidFill>
+                <a:latin typeface="Calibri" panose="020F0502020204030204" pitchFamily="34" charset="0"/>
+              </a:rPr>
+              <a:t>volume</a:t>
+            </a:r>
+            <a:r>
+              <a:rPr lang="pt-BR" sz="2000" dirty="0" smtClean="0">
+                <a:solidFill>
+                  <a:schemeClr val="tx1">
+                    <a:lumMod val="75000"/>
+                    <a:lumOff val="25000"/>
+                  </a:schemeClr>
+                </a:solidFill>
+                <a:latin typeface="Calibri" panose="020F0502020204030204" pitchFamily="34" charset="0"/>
+              </a:rPr>
+              <a:t>.</a:t>
+            </a:r>
+          </a:p>
+          <a:p>
+            <a:endParaRPr lang="pt-BR" sz="2000" dirty="0">
+              <a:solidFill>
+                <a:schemeClr val="tx1">
+                  <a:lumMod val="75000"/>
+                  <a:lumOff val="25000"/>
+                </a:schemeClr>
+              </a:solidFill>
+              <a:latin typeface="Calibri" panose="020F0502020204030204" pitchFamily="34" charset="0"/>
+            </a:endParaRPr>
+          </a:p>
+          <a:p>
+            <a:endParaRPr lang="pt-BR" sz="2000" dirty="0" smtClean="0">
+              <a:solidFill>
+                <a:schemeClr val="tx1">
+                  <a:lumMod val="75000"/>
+                  <a:lumOff val="25000"/>
+                </a:schemeClr>
+              </a:solidFill>
+              <a:latin typeface="Calibri" panose="020F0502020204030204" pitchFamily="34" charset="0"/>
+            </a:endParaRPr>
+          </a:p>
+          <a:p>
+            <a:endParaRPr lang="pt-BR" sz="2000" dirty="0">
+              <a:solidFill>
+                <a:schemeClr val="tx1">
+                  <a:lumMod val="75000"/>
+                  <a:lumOff val="25000"/>
+                </a:schemeClr>
+              </a:solidFill>
+              <a:latin typeface="Calibri" panose="020F0502020204030204" pitchFamily="34" charset="0"/>
+            </a:endParaRPr>
+          </a:p>
+          <a:p>
+            <a:endParaRPr lang="pt-BR" sz="2000" dirty="0" smtClean="0">
+              <a:solidFill>
+                <a:schemeClr val="tx1">
+                  <a:lumMod val="75000"/>
+                  <a:lumOff val="25000"/>
+                </a:schemeClr>
+              </a:solidFill>
+              <a:latin typeface="Calibri" panose="020F0502020204030204" pitchFamily="34" charset="0"/>
+            </a:endParaRPr>
+          </a:p>
+          <a:p>
+            <a:endParaRPr lang="pt-BR" sz="2000" dirty="0">
+              <a:solidFill>
+                <a:schemeClr val="tx1">
+                  <a:lumMod val="75000"/>
+                  <a:lumOff val="25000"/>
+                </a:schemeClr>
+              </a:solidFill>
+              <a:latin typeface="Calibri" panose="020F0502020204030204" pitchFamily="34" charset="0"/>
+            </a:endParaRPr>
+          </a:p>
+          <a:p>
+            <a:endParaRPr lang="pt-BR" sz="2000" dirty="0" smtClean="0">
+              <a:solidFill>
+                <a:schemeClr val="tx1">
+                  <a:lumMod val="75000"/>
+                  <a:lumOff val="25000"/>
+                </a:schemeClr>
+              </a:solidFill>
+              <a:latin typeface="Calibri" panose="020F0502020204030204" pitchFamily="34" charset="0"/>
+            </a:endParaRPr>
+          </a:p>
+          <a:p>
+            <a:endParaRPr lang="pt-BR" sz="2000" dirty="0">
+              <a:solidFill>
+                <a:schemeClr val="tx1">
+                  <a:lumMod val="75000"/>
+                  <a:lumOff val="25000"/>
+                </a:schemeClr>
+              </a:solidFill>
+              <a:latin typeface="Calibri" panose="020F0502020204030204" pitchFamily="34" charset="0"/>
+            </a:endParaRPr>
+          </a:p>
+          <a:p>
+            <a:r>
+              <a:rPr lang="pt-BR" sz="2000" dirty="0" smtClean="0">
+                <a:solidFill>
+                  <a:schemeClr val="tx1">
+                    <a:lumMod val="75000"/>
+                    <a:lumOff val="25000"/>
+                  </a:schemeClr>
+                </a:solidFill>
+                <a:latin typeface="Calibri" panose="020F0502020204030204" pitchFamily="34" charset="0"/>
+              </a:rPr>
+              <a:t>“</a:t>
+            </a:r>
+            <a:r>
+              <a:rPr lang="en-US" sz="2000" dirty="0">
+                <a:solidFill>
+                  <a:schemeClr val="tx1">
+                    <a:lumMod val="75000"/>
+                    <a:lumOff val="25000"/>
+                  </a:schemeClr>
+                </a:solidFill>
+                <a:latin typeface="Calibri" panose="020F0502020204030204" pitchFamily="34" charset="0"/>
+              </a:rPr>
+              <a:t>Semi-Automatic Generation of Transfer </a:t>
+            </a:r>
+            <a:r>
+              <a:rPr lang="en-US" sz="2000" dirty="0" smtClean="0">
+                <a:solidFill>
+                  <a:schemeClr val="tx1">
+                    <a:lumMod val="75000"/>
+                    <a:lumOff val="25000"/>
+                  </a:schemeClr>
+                </a:solidFill>
+                <a:latin typeface="Calibri" panose="020F0502020204030204" pitchFamily="34" charset="0"/>
+              </a:rPr>
+              <a:t>Functions for </a:t>
+            </a:r>
+            <a:r>
+              <a:rPr lang="en-US" sz="2000" dirty="0">
+                <a:solidFill>
+                  <a:schemeClr val="tx1">
+                    <a:lumMod val="75000"/>
+                    <a:lumOff val="25000"/>
+                  </a:schemeClr>
+                </a:solidFill>
+                <a:latin typeface="Calibri" panose="020F0502020204030204" pitchFamily="34" charset="0"/>
+              </a:rPr>
+              <a:t>Direct Volume Rendering</a:t>
+            </a:r>
+            <a:r>
+              <a:rPr lang="pt-BR" sz="2000" dirty="0" smtClean="0">
+                <a:solidFill>
+                  <a:schemeClr val="tx1">
+                    <a:lumMod val="75000"/>
+                    <a:lumOff val="25000"/>
+                  </a:schemeClr>
+                </a:solidFill>
+                <a:latin typeface="Calibri" panose="020F0502020204030204" pitchFamily="34" charset="0"/>
+              </a:rPr>
+              <a:t>” – </a:t>
+            </a:r>
+            <a:r>
+              <a:rPr lang="pt-BR" sz="2000" dirty="0" err="1" smtClean="0">
+                <a:solidFill>
+                  <a:schemeClr val="tx1">
+                    <a:lumMod val="75000"/>
+                    <a:lumOff val="25000"/>
+                  </a:schemeClr>
+                </a:solidFill>
+                <a:latin typeface="Calibri" panose="020F0502020204030204" pitchFamily="34" charset="0"/>
+              </a:rPr>
+              <a:t>Kindlmamn</a:t>
+            </a:r>
+            <a:r>
+              <a:rPr lang="pt-BR" sz="2000" dirty="0" smtClean="0">
+                <a:solidFill>
+                  <a:schemeClr val="tx1">
+                    <a:lumMod val="75000"/>
+                    <a:lumOff val="25000"/>
+                  </a:schemeClr>
+                </a:solidFill>
+                <a:latin typeface="Calibri" panose="020F0502020204030204" pitchFamily="34" charset="0"/>
+              </a:rPr>
+              <a:t> e </a:t>
+            </a:r>
+            <a:r>
+              <a:rPr lang="pt-BR" sz="2000" dirty="0" err="1" smtClean="0">
+                <a:solidFill>
+                  <a:schemeClr val="tx1">
+                    <a:lumMod val="75000"/>
+                    <a:lumOff val="25000"/>
+                  </a:schemeClr>
+                </a:solidFill>
+                <a:latin typeface="Calibri" panose="020F0502020204030204" pitchFamily="34" charset="0"/>
+              </a:rPr>
+              <a:t>Durkin</a:t>
+            </a:r>
+            <a:r>
+              <a:rPr lang="pt-BR" sz="2000" dirty="0" smtClean="0">
+                <a:solidFill>
+                  <a:schemeClr val="tx1">
+                    <a:lumMod val="75000"/>
+                    <a:lumOff val="25000"/>
+                  </a:schemeClr>
+                </a:solidFill>
+                <a:latin typeface="Calibri" panose="020F0502020204030204" pitchFamily="34" charset="0"/>
+              </a:rPr>
+              <a:t>.</a:t>
+            </a:r>
+            <a:endParaRPr lang="pt-BR" sz="1400" dirty="0">
+              <a:solidFill>
+                <a:schemeClr val="tx1">
+                  <a:lumMod val="75000"/>
+                  <a:lumOff val="25000"/>
+                </a:schemeClr>
+              </a:solidFill>
+              <a:latin typeface="Calibri" panose="020F0502020204030204" pitchFamily="34" charset="0"/>
+            </a:endParaRPr>
+          </a:p>
+        </p:txBody>
+      </p:sp>
+      <p:pic>
+        <p:nvPicPr>
+          <p:cNvPr id="5" name="Imagem 4"/>
+          <p:cNvPicPr>
+            <a:picLocks noChangeAspect="1"/>
+          </p:cNvPicPr>
+          <p:nvPr/>
+        </p:nvPicPr>
+        <p:blipFill>
+          <a:blip r:embed="rId2" cstate="print">
+            <a:extLst>
+              <a:ext uri="{28A0092B-C50C-407E-A947-70E740481C1C}">
+                <a14:useLocalDpi xmlns:a14="http://schemas.microsoft.com/office/drawing/2010/main" val="0"/>
+              </a:ext>
+            </a:extLst>
+          </a:blip>
+          <a:stretch>
+            <a:fillRect/>
+          </a:stretch>
+        </p:blipFill>
+        <p:spPr>
+          <a:xfrm>
+            <a:off x="3446875" y="2551772"/>
+            <a:ext cx="2295255" cy="2182373"/>
           </a:xfrm>
           <a:prstGeom prst="rect">
             <a:avLst/>
@@ -4238,7 +5611,7 @@
               <a:rPr lang="en-US" sz="4400" dirty="0" err="1" smtClean="0">
                 <a:latin typeface="Calibri" panose="020F0502020204030204" pitchFamily="34" charset="0"/>
               </a:rPr>
-              <a:t>Abordagem</a:t>
+              <a:t>Suposição</a:t>
             </a:r>
             <a:endParaRPr lang="pt-BR" sz="4400" dirty="0"/>
           </a:p>
@@ -4261,68 +5634,15 @@
           </a:bodyPr>
           <a:lstStyle/>
           <a:p>
-            <a:r>
-              <a:rPr lang="pt-BR" sz="2000" dirty="0" smtClean="0">
-                <a:solidFill>
-                  <a:schemeClr val="tx1">
-                    <a:lumMod val="75000"/>
-                    <a:lumOff val="25000"/>
-                  </a:schemeClr>
-                </a:solidFill>
-                <a:latin typeface="Calibri" panose="020F0502020204030204" pitchFamily="34" charset="0"/>
-              </a:rPr>
-              <a:t>Identificar </a:t>
-            </a:r>
-            <a:r>
-              <a:rPr lang="pt-BR" sz="2000" dirty="0">
-                <a:solidFill>
-                  <a:schemeClr val="tx1">
-                    <a:lumMod val="75000"/>
-                    <a:lumOff val="25000"/>
-                  </a:schemeClr>
-                </a:solidFill>
-                <a:latin typeface="Calibri" panose="020F0502020204030204" pitchFamily="34" charset="0"/>
-              </a:rPr>
-              <a:t>variações abruptas no valor dos </a:t>
-            </a:r>
-            <a:r>
-              <a:rPr lang="pt-BR" sz="2000" dirty="0" err="1">
-                <a:solidFill>
-                  <a:schemeClr val="tx1">
-                    <a:lumMod val="75000"/>
-                    <a:lumOff val="25000"/>
-                  </a:schemeClr>
-                </a:solidFill>
-                <a:latin typeface="Calibri" panose="020F0502020204030204" pitchFamily="34" charset="0"/>
-              </a:rPr>
-              <a:t>voxels</a:t>
-            </a:r>
-            <a:r>
-              <a:rPr lang="pt-BR" sz="2000" dirty="0" smtClean="0">
-                <a:solidFill>
-                  <a:schemeClr val="tx1">
-                    <a:lumMod val="75000"/>
-                    <a:lumOff val="25000"/>
-                  </a:schemeClr>
-                </a:solidFill>
-                <a:latin typeface="Calibri" panose="020F0502020204030204" pitchFamily="34" charset="0"/>
-              </a:rPr>
-              <a:t>.</a:t>
-            </a:r>
-          </a:p>
-          <a:p>
-            <a:r>
-              <a:rPr lang="pt-BR" sz="2000" dirty="0" smtClean="0">
-                <a:solidFill>
-                  <a:schemeClr val="tx1">
-                    <a:lumMod val="75000"/>
-                    <a:lumOff val="25000"/>
-                  </a:schemeClr>
-                </a:solidFill>
-                <a:latin typeface="Calibri" panose="020F0502020204030204" pitchFamily="34" charset="0"/>
-              </a:rPr>
-              <a:t>Assume modelo de fronteira como um impulso atenuado.</a:t>
-            </a:r>
+            <a:endParaRPr lang="pt-BR" sz="2000" dirty="0" smtClean="0">
+              <a:solidFill>
+                <a:schemeClr val="tx1">
+                  <a:lumMod val="75000"/>
+                  <a:lumOff val="25000"/>
+                </a:schemeClr>
+              </a:solidFill>
+              <a:latin typeface="Calibri" panose="020F0502020204030204" pitchFamily="34" charset="0"/>
+            </a:endParaRPr>
           </a:p>
           <a:p>
             <a:endParaRPr lang="pt-BR" sz="2000" dirty="0">
@@ -4347,6 +5667,76 @@
             </a:endParaRPr>
           </a:p>
           <a:p>
+            <a:r>
+              <a:rPr lang="pt-BR" sz="2000" dirty="0" smtClean="0">
+                <a:solidFill>
+                  <a:schemeClr val="tx1">
+                    <a:lumMod val="75000"/>
+                    <a:lumOff val="25000"/>
+                  </a:schemeClr>
+                </a:solidFill>
+                <a:latin typeface="Calibri" panose="020F0502020204030204" pitchFamily="34" charset="0"/>
+              </a:rPr>
+              <a:t>Materiais relativamente homogêneos.</a:t>
+            </a:r>
+            <a:endParaRPr lang="pt-BR" sz="2000" dirty="0" smtClean="0">
+              <a:solidFill>
+                <a:schemeClr val="tx1">
+                  <a:lumMod val="75000"/>
+                  <a:lumOff val="25000"/>
+                </a:schemeClr>
+              </a:solidFill>
+              <a:latin typeface="Calibri" panose="020F0502020204030204" pitchFamily="34" charset="0"/>
+            </a:endParaRPr>
+          </a:p>
+          <a:p>
+            <a:r>
+              <a:rPr lang="pt-BR" sz="2000" dirty="0" smtClean="0">
+                <a:solidFill>
+                  <a:schemeClr val="tx1">
+                    <a:lumMod val="75000"/>
+                    <a:lumOff val="25000"/>
+                  </a:schemeClr>
+                </a:solidFill>
+                <a:latin typeface="Calibri" panose="020F0502020204030204" pitchFamily="34" charset="0"/>
+              </a:rPr>
+              <a:t>Modelo </a:t>
+            </a:r>
+            <a:r>
+              <a:rPr lang="pt-BR" sz="2000" dirty="0" smtClean="0">
+                <a:solidFill>
+                  <a:schemeClr val="tx1">
+                    <a:lumMod val="75000"/>
+                    <a:lumOff val="25000"/>
+                  </a:schemeClr>
+                </a:solidFill>
+                <a:latin typeface="Calibri" panose="020F0502020204030204" pitchFamily="34" charset="0"/>
+              </a:rPr>
+              <a:t>de </a:t>
+            </a:r>
+            <a:r>
+              <a:rPr lang="pt-BR" sz="2000" dirty="0" smtClean="0">
+                <a:solidFill>
+                  <a:schemeClr val="tx1">
+                    <a:lumMod val="75000"/>
+                    <a:lumOff val="25000"/>
+                  </a:schemeClr>
+                </a:solidFill>
+                <a:latin typeface="Calibri" panose="020F0502020204030204" pitchFamily="34" charset="0"/>
+              </a:rPr>
+              <a:t>fronteira: degrau atenuado com uma gaussiana.</a:t>
+            </a:r>
+            <a:endParaRPr lang="pt-BR" sz="2000" dirty="0" smtClean="0">
+              <a:solidFill>
+                <a:schemeClr val="tx1">
+                  <a:lumMod val="75000"/>
+                  <a:lumOff val="25000"/>
+                </a:schemeClr>
+              </a:solidFill>
+              <a:latin typeface="Calibri" panose="020F0502020204030204" pitchFamily="34" charset="0"/>
+            </a:endParaRPr>
+          </a:p>
+          <a:p>
             <a:endParaRPr lang="pt-BR" sz="2000" dirty="0">
               <a:solidFill>
                 <a:schemeClr val="tx1">
@@ -4369,19 +5759,21 @@
             </a:endParaRPr>
           </a:p>
           <a:p>
-            <a:r>
-              <a:rPr lang="pt-BR" sz="2000" dirty="0" smtClean="0">
-                <a:solidFill>
-                  <a:schemeClr val="tx1">
-                    <a:lumMod val="75000"/>
-                    <a:lumOff val="25000"/>
-                  </a:schemeClr>
-                </a:solidFill>
-                <a:latin typeface="Calibri" panose="020F0502020204030204" pitchFamily="34" charset="0"/>
-              </a:rPr>
-              <a:t>Identifica a posição exata de fronteiras quando a primeira derivada é máxima e a segunda é nula.</a:t>
-            </a:r>
-            <a:endParaRPr lang="pt-BR" sz="1400" dirty="0">
+            <a:endParaRPr lang="pt-BR" sz="2000" dirty="0">
+              <a:solidFill>
+                <a:schemeClr val="tx1">
+                  <a:lumMod val="75000"/>
+                  <a:lumOff val="25000"/>
+                </a:schemeClr>
+              </a:solidFill>
+              <a:latin typeface="Calibri" panose="020F0502020204030204" pitchFamily="34" charset="0"/>
+            </a:endParaRPr>
+          </a:p>
+          <a:p>
+            <a:pPr marL="0" indent="0">
+              <a:buNone/>
+            </a:pPr>
+            <a:endParaRPr lang="pt-BR" sz="2000" dirty="0" smtClean="0">
               <a:solidFill>
                 <a:schemeClr val="tx1">
                   <a:lumMod val="75000"/>
@@ -4416,62 +5808,8 @@
         </p:blipFill>
         <p:spPr bwMode="auto">
           <a:xfrm>
-            <a:off x="2546450" y="2430303"/>
+            <a:off x="2546450" y="3879050"/>
             <a:ext cx="3930654" cy="1244433"/>
-          </a:xfrm>
-          <a:prstGeom prst="rect">
-            <a:avLst/>
-          </a:prstGeom>
-          <a:noFill/>
-          <a:ln>
-            <a:noFill/>
-          </a:ln>
-          <a:extLst>
-            <a:ext uri="{909E8E84-426E-40DD-AFC4-6F175D3DCCD1}">
-              <a14:hiddenFill xmlns:a14="http://schemas.microsoft.com/office/drawing/2010/main">
-                <a:solidFill>
-                  <a:schemeClr val="accent1"/>
-                </a:solidFill>
-              </a14:hiddenFill>
-            </a:ext>
-            <a:ext uri="{91240B29-F687-4F45-9708-019B960494DF}">
-              <a14:hiddenLine xmlns:a14="http://schemas.microsoft.com/office/drawing/2010/main" w="9525">
-                <a:solidFill>
-                  <a:schemeClr val="tx1"/>
-                </a:solidFill>
-                <a:miter lim="800000"/>
-                <a:headEnd/>
-                <a:tailEnd/>
-              </a14:hiddenLine>
-            </a:ext>
-          </a:extLst>
-        </p:spPr>
-      </p:pic>
-      <p:pic>
-        <p:nvPicPr>
-          <p:cNvPr id="6" name="Picture 3"/>
-          <p:cNvPicPr>
-            <a:picLocks noChangeAspect="1" noChangeArrowheads="1"/>
-          </p:cNvPicPr>
-          <p:nvPr/>
-        </p:nvPicPr>
-        <p:blipFill>
-          <a:blip r:embed="rId3">
-            <a:extLst>
-              <a:ext uri="{28A0092B-C50C-407E-A947-70E740481C1C}">
-                <a14:useLocalDpi xmlns:a14="http://schemas.microsoft.com/office/drawing/2010/main" val="0"/>
-              </a:ext>
-            </a:extLst>
-          </a:blip>
-          <a:srcRect/>
-          <a:stretch>
-            <a:fillRect/>
-          </a:stretch>
-        </p:blipFill>
-        <p:spPr bwMode="auto">
-          <a:xfrm>
-            <a:off x="3986935" y="4213156"/>
-            <a:ext cx="3209925" cy="2343150"/>
           </a:xfrm>
           <a:prstGeom prst="rect">
             <a:avLst/>
@@ -4557,19 +5895,7 @@
               <a:rPr lang="en-US" sz="4400" dirty="0" err="1" smtClean="0">
                 <a:latin typeface="Calibri" panose="020F0502020204030204" pitchFamily="34" charset="0"/>
               </a:rPr>
-              <a:t>Solução</a:t>
-            </a:r>
-            <a:r>
-              <a:rPr lang="en-US" sz="4400" dirty="0" smtClean="0">
-                <a:latin typeface="Calibri" panose="020F0502020204030204" pitchFamily="34" charset="0"/>
-              </a:rPr>
-              <a:t> </a:t>
-            </a:r>
-            <a:r>
-              <a:rPr lang="en-US" sz="4400" dirty="0" err="1" smtClean="0">
-                <a:latin typeface="Calibri" panose="020F0502020204030204" pitchFamily="34" charset="0"/>
-              </a:rPr>
-              <a:t>Proposta</a:t>
+              <a:t>Abordagem</a:t>
             </a:r>
             <a:endParaRPr lang="pt-BR" sz="4400" dirty="0"/>
           </a:p>
@@ -4585,145 +5911,13 @@
             <p:ph idx="1"/>
           </p:nvPr>
         </p:nvSpPr>
-        <p:spPr>
-          <a:xfrm>
-            <a:off x="457200" y="1600200"/>
-            <a:ext cx="8229600" cy="4979150"/>
-          </a:xfrm>
-        </p:spPr>
+        <p:spPr/>
         <p:txBody>
           <a:bodyPr>
             <a:normAutofit/>
           </a:bodyPr>
           <a:lstStyle/>
           <a:p>
-            <a:r>
-              <a:rPr lang="pt-BR" sz="2000" dirty="0" err="1" smtClean="0">
-                <a:solidFill>
-                  <a:schemeClr val="tx1">
-                    <a:lumMod val="75000"/>
-                    <a:lumOff val="25000"/>
-                  </a:schemeClr>
-                </a:solidFill>
-                <a:latin typeface="Calibri" panose="020F0502020204030204" pitchFamily="34" charset="0"/>
-              </a:rPr>
-              <a:t>Análisar</a:t>
-            </a:r>
-            <a:r>
-              <a:rPr lang="pt-BR" sz="2000" dirty="0" smtClean="0">
-                <a:solidFill>
-                  <a:schemeClr val="tx1">
-                    <a:lumMod val="75000"/>
-                    <a:lumOff val="25000"/>
-                  </a:schemeClr>
-                </a:solidFill>
-                <a:latin typeface="Calibri" panose="020F0502020204030204" pitchFamily="34" charset="0"/>
-              </a:rPr>
-              <a:t> a partir de um histograma, pois permite uma solução que independe da </a:t>
-            </a:r>
-            <a:r>
-              <a:rPr lang="pt-BR" sz="2000" dirty="0" err="1" smtClean="0">
-                <a:solidFill>
-                  <a:schemeClr val="tx1">
-                    <a:lumMod val="75000"/>
-                    <a:lumOff val="25000"/>
-                  </a:schemeClr>
-                </a:solidFill>
-                <a:latin typeface="Calibri" panose="020F0502020204030204" pitchFamily="34" charset="0"/>
-              </a:rPr>
-              <a:t>posiçao</a:t>
-            </a:r>
-            <a:r>
-              <a:rPr lang="pt-BR" sz="2000" dirty="0" smtClean="0">
-                <a:solidFill>
-                  <a:schemeClr val="tx1">
-                    <a:lumMod val="75000"/>
-                    <a:lumOff val="25000"/>
-                  </a:schemeClr>
-                </a:solidFill>
-                <a:latin typeface="Calibri" panose="020F0502020204030204" pitchFamily="34" charset="0"/>
-              </a:rPr>
-              <a:t> do </a:t>
-            </a:r>
-            <a:r>
-              <a:rPr lang="pt-BR" sz="2000" dirty="0" err="1" smtClean="0">
-                <a:solidFill>
-                  <a:schemeClr val="tx1">
-                    <a:lumMod val="75000"/>
-                    <a:lumOff val="25000"/>
-                  </a:schemeClr>
-                </a:solidFill>
-                <a:latin typeface="Calibri" panose="020F0502020204030204" pitchFamily="34" charset="0"/>
-              </a:rPr>
-              <a:t>voxel</a:t>
-            </a:r>
-            <a:r>
-              <a:rPr lang="pt-BR" sz="2000" dirty="0" smtClean="0">
-                <a:solidFill>
-                  <a:schemeClr val="tx1">
-                    <a:lumMod val="75000"/>
-                    <a:lumOff val="25000"/>
-                  </a:schemeClr>
-                </a:solidFill>
-                <a:latin typeface="Calibri" panose="020F0502020204030204" pitchFamily="34" charset="0"/>
-              </a:rPr>
-              <a:t>.</a:t>
-            </a:r>
-          </a:p>
-          <a:p>
-            <a:r>
-              <a:rPr lang="pt-BR" sz="2000" dirty="0" smtClean="0">
-                <a:solidFill>
-                  <a:schemeClr val="tx1">
-                    <a:lumMod val="75000"/>
-                    <a:lumOff val="25000"/>
-                  </a:schemeClr>
-                </a:solidFill>
-                <a:latin typeface="Calibri" panose="020F0502020204030204" pitchFamily="34" charset="0"/>
-              </a:rPr>
-              <a:t>Histograma 3D guarda a quantidade de ocorrências de cada </a:t>
-            </a:r>
-            <a:r>
-              <a:rPr lang="pt-BR" sz="2000" dirty="0" err="1" smtClean="0">
-                <a:solidFill>
-                  <a:schemeClr val="tx1">
-                    <a:lumMod val="75000"/>
-                    <a:lumOff val="25000"/>
-                  </a:schemeClr>
-                </a:solidFill>
-                <a:latin typeface="Calibri" panose="020F0502020204030204" pitchFamily="34" charset="0"/>
-              </a:rPr>
-              <a:t>triade</a:t>
-            </a:r>
-            <a:r>
-              <a:rPr lang="pt-BR" sz="2000" dirty="0" smtClean="0">
-                <a:solidFill>
-                  <a:schemeClr val="tx1">
-                    <a:lumMod val="75000"/>
-                    <a:lumOff val="25000"/>
-                  </a:schemeClr>
-                </a:solidFill>
-                <a:latin typeface="Calibri" panose="020F0502020204030204" pitchFamily="34" charset="0"/>
-              </a:rPr>
-              <a:t> f, f’ e f’’ em 8 bits </a:t>
-            </a:r>
-            <a:r>
-              <a:rPr lang="en-US" sz="2000" dirty="0" smtClean="0">
-                <a:solidFill>
-                  <a:schemeClr val="tx1">
-                    <a:lumMod val="75000"/>
-                    <a:lumOff val="25000"/>
-                  </a:schemeClr>
-                </a:solidFill>
-                <a:latin typeface="Calibri" panose="020F0502020204030204" pitchFamily="34" charset="0"/>
-              </a:rPr>
-              <a:t>(0-255).</a:t>
-            </a:r>
-          </a:p>
-          <a:p>
-            <a:pPr marL="0" indent="0">
-              <a:buNone/>
-            </a:pPr>
             <a:endParaRPr lang="pt-BR" sz="2000" dirty="0" smtClean="0">
               <a:solidFill>
                 <a:schemeClr val="tx1">
@@ -4745,21 +5939,44 @@
                 </a:solidFill>
                 <a:latin typeface="Calibri" panose="020F0502020204030204" pitchFamily="34" charset="0"/>
               </a:rPr>
-              <a:t>O histograma acumulado em um eixo permite verificar a quantidade de fronteiras identificadas.</a:t>
-            </a:r>
-          </a:p>
-          <a:p>
-            <a:endParaRPr lang="pt-BR" sz="2000" dirty="0">
-              <a:solidFill>
-                <a:schemeClr val="tx1">
-                  <a:lumMod val="75000"/>
-                  <a:lumOff val="25000"/>
-                </a:schemeClr>
-              </a:solidFill>
-              <a:latin typeface="Calibri" panose="020F0502020204030204" pitchFamily="34" charset="0"/>
-            </a:endParaRPr>
-          </a:p>
-          <a:p>
+              <a:t>Identificar </a:t>
+            </a:r>
+            <a:r>
+              <a:rPr lang="pt-BR" sz="2000" dirty="0">
+                <a:solidFill>
+                  <a:schemeClr val="tx1">
+                    <a:lumMod val="75000"/>
+                    <a:lumOff val="25000"/>
+                  </a:schemeClr>
+                </a:solidFill>
+                <a:latin typeface="Calibri" panose="020F0502020204030204" pitchFamily="34" charset="0"/>
+              </a:rPr>
+              <a:t>variações abruptas no valor dos </a:t>
+            </a:r>
+            <a:r>
+              <a:rPr lang="pt-BR" sz="2000" dirty="0" err="1" smtClean="0">
+                <a:solidFill>
+                  <a:schemeClr val="tx1">
+                    <a:lumMod val="75000"/>
+                    <a:lumOff val="25000"/>
+                  </a:schemeClr>
+                </a:solidFill>
+                <a:latin typeface="Calibri" panose="020F0502020204030204" pitchFamily="34" charset="0"/>
+              </a:rPr>
+              <a:t>voxels</a:t>
+            </a:r>
+            <a:r>
+              <a:rPr lang="pt-BR" sz="2000" dirty="0" smtClean="0">
+                <a:solidFill>
+                  <a:schemeClr val="tx1">
+                    <a:lumMod val="75000"/>
+                    <a:lumOff val="25000"/>
+                  </a:schemeClr>
+                </a:solidFill>
+                <a:latin typeface="Calibri" panose="020F0502020204030204" pitchFamily="34" charset="0"/>
+              </a:rPr>
+              <a:t>, na direção do gradiente.</a:t>
+            </a:r>
             <a:endParaRPr lang="pt-BR" sz="2000" dirty="0" smtClean="0">
               <a:solidFill>
                 <a:schemeClr val="tx1">
@@ -4771,7 +5988,19 @@
             </a:endParaRPr>
           </a:p>
           <a:p>
-            <a:endParaRPr lang="pt-BR" sz="2000" dirty="0">
+            <a:r>
+              <a:rPr lang="pt-BR" sz="2000" dirty="0" smtClean="0">
+                <a:solidFill>
+                  <a:schemeClr val="tx1">
+                    <a:lumMod val="75000"/>
+                    <a:lumOff val="25000"/>
+                  </a:schemeClr>
+                </a:solidFill>
+                <a:latin typeface="Calibri" panose="020F0502020204030204" pitchFamily="34" charset="0"/>
+              </a:rPr>
+              <a:t>Identifica a posição exata de fronteiras quando a primeira derivada é máxima e a segunda é nula.</a:t>
+            </a:r>
+            <a:endParaRPr lang="pt-BR" sz="1400" dirty="0">
               <a:solidFill>
                 <a:schemeClr val="tx1">
                   <a:lumMod val="75000"/>
@@ -4781,59 +6010,11 @@
               <a:latin typeface="Calibri" panose="020F0502020204030204" pitchFamily="34" charset="0"/>
             </a:endParaRPr>
           </a:p>
-          <a:p>
-            <a:endParaRPr lang="pt-BR" sz="2000" dirty="0" smtClean="0">
-              <a:solidFill>
-                <a:schemeClr val="tx1">
-                  <a:lumMod val="75000"/>
-                  <a:lumOff val="25000"/>
-                </a:schemeClr>
-              </a:solidFill>
-              <a:latin typeface="Calibri" panose="020F0502020204030204" pitchFamily="34" charset="0"/>
-            </a:endParaRPr>
-          </a:p>
-          <a:p>
-            <a:endParaRPr lang="pt-BR" sz="2000" dirty="0">
-              <a:solidFill>
-                <a:schemeClr val="tx1">
-                  <a:lumMod val="75000"/>
-                  <a:lumOff val="25000"/>
-                </a:schemeClr>
-              </a:solidFill>
-              <a:latin typeface="Calibri" panose="020F0502020204030204" pitchFamily="34" charset="0"/>
-            </a:endParaRPr>
-          </a:p>
-          <a:p>
-            <a:pPr marL="0" indent="0" algn="ctr">
-              <a:buNone/>
-            </a:pPr>
-            <a:r>
-              <a:rPr lang="pt-BR" sz="1400" dirty="0" smtClean="0">
-                <a:solidFill>
-                  <a:schemeClr val="tx1">
-                    <a:lumMod val="75000"/>
-                    <a:lumOff val="25000"/>
-                  </a:schemeClr>
-                </a:solidFill>
-                <a:latin typeface="Calibri" panose="020F0502020204030204" pitchFamily="34" charset="0"/>
-              </a:rPr>
-              <a:t>Histograma acumulado por f’ e f’’, para fronteiras como o modelo assumido.</a:t>
-            </a:r>
-            <a:endParaRPr lang="pt-BR" sz="1400" dirty="0" smtClean="0">
-              <a:solidFill>
-                <a:schemeClr val="tx1">
-                  <a:lumMod val="75000"/>
-                  <a:lumOff val="25000"/>
-                </a:schemeClr>
-              </a:solidFill>
-              <a:latin typeface="Calibri" panose="020F0502020204030204" pitchFamily="34" charset="0"/>
-            </a:endParaRPr>
-          </a:p>
         </p:txBody>
       </p:sp>
       <p:pic>
         <p:nvPicPr>
-          <p:cNvPr id="2053" name="Picture 5"/>
+          <p:cNvPr id="6" name="Picture 3"/>
           <p:cNvPicPr>
             <a:picLocks noChangeAspect="1" noChangeArrowheads="1"/>
           </p:cNvPicPr>
@@ -4854,8 +6035,8 @@
         </p:blipFill>
         <p:spPr bwMode="auto">
           <a:xfrm>
-            <a:off x="3176845" y="4284095"/>
-            <a:ext cx="2970330" cy="1453177"/>
+            <a:off x="2996825" y="3293985"/>
+            <a:ext cx="3209925" cy="2343150"/>
           </a:xfrm>
           <a:prstGeom prst="rect">
             <a:avLst/>
@@ -4888,7 +6069,7 @@
     </p:spTree>
     <p:extLst>
       <p:ext uri="{BB962C8B-B14F-4D97-AF65-F5344CB8AC3E}">
-        <p14:creationId xmlns:p14="http://schemas.microsoft.com/office/powerpoint/2010/main" val="497509476"/>
+        <p14:creationId xmlns:p14="http://schemas.microsoft.com/office/powerpoint/2010/main" val="313992101"/>
       </p:ext>
     </p:extLst>
   </p:cSld>
@@ -4938,19 +6119,19 @@
           <a:lstStyle/>
           <a:p>
             <a:r>
-              <a:rPr lang="en-US" sz="4400" dirty="0" err="1">
+              <a:rPr lang="en-US" sz="4400" dirty="0" err="1" smtClean="0">
                 <a:latin typeface="Calibri" panose="020F0502020204030204" pitchFamily="34" charset="0"/>
               </a:rPr>
               <a:t>Solução</a:t>
             </a:r>
             <a:r>
-              <a:rPr lang="en-US" sz="4400" dirty="0">
+              <a:rPr lang="en-US" sz="4400" dirty="0" smtClean="0">
                 <a:latin typeface="Calibri" panose="020F0502020204030204" pitchFamily="34" charset="0"/>
               </a:rPr>
               <a:t> </a:t>
             </a:r>
             <a:r>
-              <a:rPr lang="en-US" sz="4400" dirty="0" err="1">
+              <a:rPr lang="en-US" sz="4400" dirty="0" err="1" smtClean="0">
                 <a:latin typeface="Calibri" panose="020F0502020204030204" pitchFamily="34" charset="0"/>
               </a:rPr>
               <a:t>Proposta</a:t>
@@ -4969,7 +6150,12 @@
             <p:ph idx="1"/>
           </p:nvPr>
         </p:nvSpPr>
-        <p:spPr/>
+        <p:spPr>
+          <a:xfrm>
+            <a:off x="457200" y="1600200"/>
+            <a:ext cx="8229600" cy="4979150"/>
+          </a:xfrm>
+        </p:spPr>
         <p:txBody>
           <a:bodyPr>
             <a:normAutofit/>
@@ -4987,78 +6173,6 @@
             </a:endParaRPr>
           </a:p>
           <a:p>
-            <a:r>
-              <a:rPr lang="pt-BR" sz="2000" dirty="0" smtClean="0">
-                <a:solidFill>
-                  <a:schemeClr val="tx1">
-                    <a:lumMod val="75000"/>
-                    <a:lumOff val="25000"/>
-                  </a:schemeClr>
-                </a:solidFill>
-                <a:latin typeface="Calibri" panose="020F0502020204030204" pitchFamily="34" charset="0"/>
-              </a:rPr>
-              <a:t>Dado o modelo matemático para a fronteira é possível extrair a distância </a:t>
-            </a:r>
-            <a:r>
-              <a:rPr lang="pt-BR" sz="2000" b="1" i="1" dirty="0" smtClean="0">
-                <a:solidFill>
-                  <a:schemeClr val="tx1">
-                    <a:lumMod val="75000"/>
-                    <a:lumOff val="25000"/>
-                  </a:schemeClr>
-                </a:solidFill>
-                <a:latin typeface="Calibri" panose="020F0502020204030204" pitchFamily="34" charset="0"/>
-              </a:rPr>
-              <a:t>x</a:t>
-            </a:r>
-            <a:r>
-              <a:rPr lang="pt-BR" sz="2000" dirty="0" smtClean="0">
-                <a:solidFill>
-                  <a:schemeClr val="tx1">
-                    <a:lumMod val="75000"/>
-                    <a:lumOff val="25000"/>
-                  </a:schemeClr>
-                </a:solidFill>
-                <a:latin typeface="Calibri" panose="020F0502020204030204" pitchFamily="34" charset="0"/>
-              </a:rPr>
-              <a:t> </a:t>
-            </a:r>
-            <a:r>
-              <a:rPr lang="pt-BR" sz="2000" dirty="0" smtClean="0">
-                <a:solidFill>
-                  <a:schemeClr val="tx1">
-                    <a:lumMod val="75000"/>
-                    <a:lumOff val="25000"/>
-                  </a:schemeClr>
-                </a:solidFill>
-                <a:latin typeface="Calibri" panose="020F0502020204030204" pitchFamily="34" charset="0"/>
-              </a:rPr>
-              <a:t>de cada </a:t>
-            </a:r>
-            <a:r>
-              <a:rPr lang="pt-BR" sz="2000" dirty="0" err="1" smtClean="0">
-                <a:solidFill>
-                  <a:schemeClr val="tx1">
-                    <a:lumMod val="75000"/>
-                    <a:lumOff val="25000"/>
-                  </a:schemeClr>
-                </a:solidFill>
-                <a:latin typeface="Calibri" panose="020F0502020204030204" pitchFamily="34" charset="0"/>
-              </a:rPr>
-              <a:t>voxel</a:t>
-            </a:r>
-            <a:r>
-              <a:rPr lang="pt-BR" sz="2000" dirty="0" smtClean="0">
-                <a:solidFill>
-                  <a:schemeClr val="tx1">
-                    <a:lumMod val="75000"/>
-                    <a:lumOff val="25000"/>
-                  </a:schemeClr>
-                </a:solidFill>
-                <a:latin typeface="Calibri" panose="020F0502020204030204" pitchFamily="34" charset="0"/>
-              </a:rPr>
-              <a:t> para a fronteira mais próxima, na direção do gradiente.</a:t>
-            </a:r>
             <a:endParaRPr lang="pt-BR" sz="2000" dirty="0" smtClean="0">
               <a:solidFill>
                 <a:schemeClr val="tx1">
@@ -5068,6 +6182,728 @@
               </a:solidFill>
               <a:latin typeface="Calibri" panose="020F0502020204030204" pitchFamily="34" charset="0"/>
             </a:endParaRPr>
+          </a:p>
+          <a:p>
+            <a:r>
+              <a:rPr lang="pt-BR" sz="2000" dirty="0" smtClean="0">
+                <a:solidFill>
+                  <a:schemeClr val="tx1">
+                    <a:lumMod val="75000"/>
+                    <a:lumOff val="25000"/>
+                  </a:schemeClr>
+                </a:solidFill>
+                <a:latin typeface="Calibri" panose="020F0502020204030204" pitchFamily="34" charset="0"/>
+              </a:rPr>
+              <a:t>Analisar </a:t>
+            </a:r>
+            <a:r>
+              <a:rPr lang="pt-BR" sz="2000" dirty="0" smtClean="0">
+                <a:solidFill>
+                  <a:schemeClr val="tx1">
+                    <a:lumMod val="75000"/>
+                    <a:lumOff val="25000"/>
+                  </a:schemeClr>
+                </a:solidFill>
+                <a:latin typeface="Calibri" panose="020F0502020204030204" pitchFamily="34" charset="0"/>
+              </a:rPr>
+              <a:t>a partir de um histograma, pois permite uma solução que independe da </a:t>
+            </a:r>
+            <a:r>
+              <a:rPr lang="pt-BR" sz="2000" dirty="0" err="1" smtClean="0">
+                <a:solidFill>
+                  <a:schemeClr val="tx1">
+                    <a:lumMod val="75000"/>
+                    <a:lumOff val="25000"/>
+                  </a:schemeClr>
+                </a:solidFill>
+                <a:latin typeface="Calibri" panose="020F0502020204030204" pitchFamily="34" charset="0"/>
+              </a:rPr>
+              <a:t>posiçao</a:t>
+            </a:r>
+            <a:r>
+              <a:rPr lang="pt-BR" sz="2000" dirty="0" smtClean="0">
+                <a:solidFill>
+                  <a:schemeClr val="tx1">
+                    <a:lumMod val="75000"/>
+                    <a:lumOff val="25000"/>
+                  </a:schemeClr>
+                </a:solidFill>
+                <a:latin typeface="Calibri" panose="020F0502020204030204" pitchFamily="34" charset="0"/>
+              </a:rPr>
+              <a:t> </a:t>
+            </a:r>
+            <a:r>
+              <a:rPr lang="pt-BR" sz="2000" dirty="0" smtClean="0">
+                <a:solidFill>
+                  <a:schemeClr val="tx1">
+                    <a:lumMod val="75000"/>
+                    <a:lumOff val="25000"/>
+                  </a:schemeClr>
+                </a:solidFill>
+                <a:latin typeface="Calibri" panose="020F0502020204030204" pitchFamily="34" charset="0"/>
+              </a:rPr>
+              <a:t>dos </a:t>
+            </a:r>
+            <a:r>
+              <a:rPr lang="pt-BR" sz="2000" dirty="0" err="1" smtClean="0">
+                <a:solidFill>
+                  <a:schemeClr val="tx1">
+                    <a:lumMod val="75000"/>
+                    <a:lumOff val="25000"/>
+                  </a:schemeClr>
+                </a:solidFill>
+                <a:latin typeface="Calibri" panose="020F0502020204030204" pitchFamily="34" charset="0"/>
+              </a:rPr>
+              <a:t>voxels</a:t>
+            </a:r>
+            <a:r>
+              <a:rPr lang="pt-BR" sz="2000" dirty="0" smtClean="0">
+                <a:solidFill>
+                  <a:schemeClr val="tx1">
+                    <a:lumMod val="75000"/>
+                    <a:lumOff val="25000"/>
+                  </a:schemeClr>
+                </a:solidFill>
+                <a:latin typeface="Calibri" panose="020F0502020204030204" pitchFamily="34" charset="0"/>
+              </a:rPr>
+              <a:t>.</a:t>
+            </a:r>
+            <a:endParaRPr lang="pt-BR" sz="2000" dirty="0" smtClean="0">
+              <a:solidFill>
+                <a:schemeClr val="tx1">
+                  <a:lumMod val="75000"/>
+                  <a:lumOff val="25000"/>
+                </a:schemeClr>
+              </a:solidFill>
+              <a:latin typeface="Calibri" panose="020F0502020204030204" pitchFamily="34" charset="0"/>
+            </a:endParaRPr>
+          </a:p>
+          <a:p>
+            <a:r>
+              <a:rPr lang="pt-BR" sz="2000" dirty="0" smtClean="0">
+                <a:solidFill>
+                  <a:schemeClr val="tx1">
+                    <a:lumMod val="75000"/>
+                    <a:lumOff val="25000"/>
+                  </a:schemeClr>
+                </a:solidFill>
+                <a:latin typeface="Calibri" panose="020F0502020204030204" pitchFamily="34" charset="0"/>
+              </a:rPr>
+              <a:t>Histograma 3D guarda a quantidade de ocorrências de cada </a:t>
+            </a:r>
+            <a:r>
+              <a:rPr lang="pt-BR" sz="2000" dirty="0" err="1" smtClean="0">
+                <a:solidFill>
+                  <a:schemeClr val="tx1">
+                    <a:lumMod val="75000"/>
+                    <a:lumOff val="25000"/>
+                  </a:schemeClr>
+                </a:solidFill>
+                <a:latin typeface="Calibri" panose="020F0502020204030204" pitchFamily="34" charset="0"/>
+              </a:rPr>
+              <a:t>triade</a:t>
+            </a:r>
+            <a:r>
+              <a:rPr lang="pt-BR" sz="2000" dirty="0" smtClean="0">
+                <a:solidFill>
+                  <a:schemeClr val="tx1">
+                    <a:lumMod val="75000"/>
+                    <a:lumOff val="25000"/>
+                  </a:schemeClr>
+                </a:solidFill>
+                <a:latin typeface="Calibri" panose="020F0502020204030204" pitchFamily="34" charset="0"/>
+              </a:rPr>
+              <a:t> f, f’ e f</a:t>
+            </a:r>
+            <a:r>
+              <a:rPr lang="pt-BR" sz="2000" dirty="0" smtClean="0">
+                <a:solidFill>
+                  <a:schemeClr val="tx1">
+                    <a:lumMod val="75000"/>
+                    <a:lumOff val="25000"/>
+                  </a:schemeClr>
+                </a:solidFill>
+                <a:latin typeface="Calibri" panose="020F0502020204030204" pitchFamily="34" charset="0"/>
+              </a:rPr>
+              <a:t>’’</a:t>
+            </a:r>
+            <a:r>
+              <a:rPr lang="en-US" sz="2000" dirty="0" smtClean="0">
+                <a:solidFill>
+                  <a:schemeClr val="tx1">
+                    <a:lumMod val="75000"/>
+                    <a:lumOff val="25000"/>
+                  </a:schemeClr>
+                </a:solidFill>
+                <a:latin typeface="Calibri" panose="020F0502020204030204" pitchFamily="34" charset="0"/>
+              </a:rPr>
+              <a:t>.</a:t>
+            </a:r>
+          </a:p>
+          <a:p>
+            <a:r>
+              <a:rPr lang="en-US" sz="2000" dirty="0" err="1">
+                <a:solidFill>
+                  <a:schemeClr val="tx1">
+                    <a:lumMod val="75000"/>
+                    <a:lumOff val="25000"/>
+                  </a:schemeClr>
+                </a:solidFill>
+                <a:latin typeface="Calibri" panose="020F0502020204030204" pitchFamily="34" charset="0"/>
+              </a:rPr>
+              <a:t>Qual</a:t>
+            </a:r>
+            <a:r>
+              <a:rPr lang="en-US" sz="2000" dirty="0">
+                <a:solidFill>
+                  <a:schemeClr val="tx1">
+                    <a:lumMod val="75000"/>
+                    <a:lumOff val="25000"/>
+                  </a:schemeClr>
+                </a:solidFill>
+                <a:latin typeface="Calibri" panose="020F0502020204030204" pitchFamily="34" charset="0"/>
+              </a:rPr>
+              <a:t> </a:t>
+            </a:r>
+            <a:r>
+              <a:rPr lang="en-US" sz="2000" dirty="0" err="1">
+                <a:solidFill>
+                  <a:schemeClr val="tx1">
+                    <a:lumMod val="75000"/>
+                    <a:lumOff val="25000"/>
+                  </a:schemeClr>
+                </a:solidFill>
+                <a:latin typeface="Calibri" panose="020F0502020204030204" pitchFamily="34" charset="0"/>
+              </a:rPr>
+              <a:t>deve</a:t>
+            </a:r>
+            <a:r>
+              <a:rPr lang="en-US" sz="2000" dirty="0">
+                <a:solidFill>
+                  <a:schemeClr val="tx1">
+                    <a:lumMod val="75000"/>
+                    <a:lumOff val="25000"/>
+                  </a:schemeClr>
+                </a:solidFill>
+                <a:latin typeface="Calibri" panose="020F0502020204030204" pitchFamily="34" charset="0"/>
+              </a:rPr>
+              <a:t> </a:t>
+            </a:r>
+            <a:r>
+              <a:rPr lang="en-US" sz="2000" dirty="0" err="1">
+                <a:solidFill>
+                  <a:schemeClr val="tx1">
+                    <a:lumMod val="75000"/>
+                    <a:lumOff val="25000"/>
+                  </a:schemeClr>
+                </a:solidFill>
+                <a:latin typeface="Calibri" panose="020F0502020204030204" pitchFamily="34" charset="0"/>
+              </a:rPr>
+              <a:t>ser</a:t>
+            </a:r>
+            <a:r>
+              <a:rPr lang="en-US" sz="2000" dirty="0">
+                <a:solidFill>
+                  <a:schemeClr val="tx1">
+                    <a:lumMod val="75000"/>
+                    <a:lumOff val="25000"/>
+                  </a:schemeClr>
+                </a:solidFill>
+                <a:latin typeface="Calibri" panose="020F0502020204030204" pitchFamily="34" charset="0"/>
+              </a:rPr>
+              <a:t> o Range do </a:t>
+            </a:r>
+            <a:r>
+              <a:rPr lang="en-US" sz="2000" dirty="0" err="1">
+                <a:solidFill>
+                  <a:schemeClr val="tx1">
+                    <a:lumMod val="75000"/>
+                    <a:lumOff val="25000"/>
+                  </a:schemeClr>
+                </a:solidFill>
+                <a:latin typeface="Calibri" panose="020F0502020204030204" pitchFamily="34" charset="0"/>
+              </a:rPr>
+              <a:t>histograma</a:t>
+            </a:r>
+            <a:r>
+              <a:rPr lang="en-US" sz="2000" dirty="0">
+                <a:solidFill>
+                  <a:schemeClr val="tx1">
+                    <a:lumMod val="75000"/>
+                    <a:lumOff val="25000"/>
+                  </a:schemeClr>
+                </a:solidFill>
+                <a:latin typeface="Calibri" panose="020F0502020204030204" pitchFamily="34" charset="0"/>
+              </a:rPr>
+              <a:t>?</a:t>
+            </a:r>
+            <a:endParaRPr lang="pt-BR" sz="2000" dirty="0">
+              <a:solidFill>
+                <a:schemeClr val="tx1">
+                  <a:lumMod val="75000"/>
+                  <a:lumOff val="25000"/>
+                </a:schemeClr>
+              </a:solidFill>
+              <a:latin typeface="Calibri" panose="020F0502020204030204" pitchFamily="34" charset="0"/>
+            </a:endParaRPr>
+          </a:p>
+          <a:p>
+            <a:endParaRPr lang="en-US" sz="2000" dirty="0">
+              <a:solidFill>
+                <a:schemeClr val="tx1">
+                  <a:lumMod val="75000"/>
+                  <a:lumOff val="25000"/>
+                </a:schemeClr>
+              </a:solidFill>
+              <a:latin typeface="Calibri" panose="020F0502020204030204" pitchFamily="34" charset="0"/>
+            </a:endParaRPr>
+          </a:p>
+        </p:txBody>
+      </p:sp>
+    </p:spTree>
+    <p:extLst>
+      <p:ext uri="{BB962C8B-B14F-4D97-AF65-F5344CB8AC3E}">
+        <p14:creationId xmlns:p14="http://schemas.microsoft.com/office/powerpoint/2010/main" val="497509476"/>
+      </p:ext>
+    </p:extLst>
+  </p:cSld>
+  <p:clrMapOvr>
+    <a:masterClrMapping/>
+  </p:clrMapOvr>
+  <p:timing>
+    <p:tnLst>
+      <p:par>
+        <p:cTn id="1" dur="indefinite" restart="never" nodeType="tmRoot"/>
+      </p:par>
+    </p:tnLst>
+  </p:timing>
+</p:sld>
+</file>
+
+<file path=ppt/slides/slide6.xml><?xml version="1.0" encoding="utf-8"?>
+<p:sld xmlns:a="http://schemas.openxmlformats.org/drawingml/2006/main" xmlns:r="http://schemas.openxmlformats.org/officeDocument/2006/relationships" xmlns:p="http://schemas.openxmlformats.org/presentationml/2006/main">
+  <p:cSld>
+    <p:spTree>
+      <p:nvGrpSpPr>
+        <p:cNvPr id="1" name=""/>
+        <p:cNvGrpSpPr/>
+        <p:nvPr/>
+      </p:nvGrpSpPr>
+      <p:grpSpPr>
+        <a:xfrm>
+          <a:off x="0" y="0"/>
+          <a:ext cx="0" cy="0"/>
+          <a:chOff x="0" y="0"/>
+          <a:chExt cx="0" cy="0"/>
+        </a:xfrm>
+      </p:grpSpPr>
+      <p:sp>
+        <p:nvSpPr>
+          <p:cNvPr id="2" name="Title 1"/>
+          <p:cNvSpPr>
+            <a:spLocks noGrp="1"/>
+          </p:cNvSpPr>
+          <p:nvPr>
+            <p:ph type="title"/>
+          </p:nvPr>
+        </p:nvSpPr>
+        <p:spPr/>
+        <p:txBody>
+          <a:bodyPr anchor="ctr"/>
+          <a:lstStyle/>
+          <a:p>
+            <a:r>
+              <a:rPr lang="en-US" sz="4400" dirty="0" err="1" smtClean="0">
+                <a:latin typeface="Calibri" panose="020F0502020204030204" pitchFamily="34" charset="0"/>
+              </a:rPr>
+              <a:t>Solução</a:t>
+            </a:r>
+            <a:r>
+              <a:rPr lang="en-US" sz="4400" dirty="0" smtClean="0">
+                <a:latin typeface="Calibri" panose="020F0502020204030204" pitchFamily="34" charset="0"/>
+              </a:rPr>
+              <a:t> </a:t>
+            </a:r>
+            <a:r>
+              <a:rPr lang="en-US" sz="4400" dirty="0" err="1" smtClean="0">
+                <a:latin typeface="Calibri" panose="020F0502020204030204" pitchFamily="34" charset="0"/>
+              </a:rPr>
+              <a:t>Proposta</a:t>
+            </a:r>
+            <a:endParaRPr lang="pt-BR" sz="4400" dirty="0"/>
+          </a:p>
+        </p:txBody>
+      </p:sp>
+      <p:sp>
+        <p:nvSpPr>
+          <p:cNvPr id="3" name="Content Placeholder 2"/>
+          <p:cNvSpPr>
+            <a:spLocks noGrp="1"/>
+          </p:cNvSpPr>
+          <p:nvPr>
+            <p:ph idx="1"/>
+          </p:nvPr>
+        </p:nvSpPr>
+        <p:spPr>
+          <a:xfrm>
+            <a:off x="457200" y="1600200"/>
+            <a:ext cx="8229600" cy="4979150"/>
+          </a:xfrm>
+        </p:spPr>
+        <p:txBody>
+          <a:bodyPr>
+            <a:normAutofit/>
+          </a:bodyPr>
+          <a:lstStyle/>
+          <a:p>
+            <a:endParaRPr lang="pt-BR" sz="2000" dirty="0" smtClean="0">
+              <a:solidFill>
+                <a:schemeClr val="tx1">
+                  <a:lumMod val="75000"/>
+                  <a:lumOff val="25000"/>
+                </a:schemeClr>
+              </a:solidFill>
+              <a:latin typeface="Calibri" panose="020F0502020204030204" pitchFamily="34" charset="0"/>
+            </a:endParaRPr>
+          </a:p>
+          <a:p>
+            <a:endParaRPr lang="pt-BR" sz="2000" dirty="0">
+              <a:solidFill>
+                <a:schemeClr val="tx1">
+                  <a:lumMod val="75000"/>
+                  <a:lumOff val="25000"/>
+                </a:schemeClr>
+              </a:solidFill>
+              <a:latin typeface="Calibri" panose="020F0502020204030204" pitchFamily="34" charset="0"/>
+            </a:endParaRPr>
+          </a:p>
+          <a:p>
+            <a:endParaRPr lang="pt-BR" sz="2000" dirty="0" smtClean="0">
+              <a:solidFill>
+                <a:schemeClr val="tx1">
+                  <a:lumMod val="75000"/>
+                  <a:lumOff val="25000"/>
+                </a:schemeClr>
+              </a:solidFill>
+              <a:latin typeface="Calibri" panose="020F0502020204030204" pitchFamily="34" charset="0"/>
+            </a:endParaRPr>
+          </a:p>
+          <a:p>
+            <a:r>
+              <a:rPr lang="pt-BR" sz="2000" dirty="0" smtClean="0">
+                <a:solidFill>
+                  <a:schemeClr val="tx1">
+                    <a:lumMod val="75000"/>
+                    <a:lumOff val="25000"/>
+                  </a:schemeClr>
+                </a:solidFill>
+                <a:latin typeface="Calibri" panose="020F0502020204030204" pitchFamily="34" charset="0"/>
+              </a:rPr>
+              <a:t>O </a:t>
+            </a:r>
+            <a:r>
+              <a:rPr lang="pt-BR" sz="2000" dirty="0" smtClean="0">
+                <a:solidFill>
+                  <a:schemeClr val="tx1">
+                    <a:lumMod val="75000"/>
+                    <a:lumOff val="25000"/>
+                  </a:schemeClr>
+                </a:solidFill>
+                <a:latin typeface="Calibri" panose="020F0502020204030204" pitchFamily="34" charset="0"/>
+              </a:rPr>
+              <a:t>histograma acumulado em um eixo permite verificar a quantidade de fronteiras identificadas.</a:t>
+            </a:r>
+          </a:p>
+          <a:p>
+            <a:endParaRPr lang="pt-BR" sz="2000" dirty="0">
+              <a:solidFill>
+                <a:schemeClr val="tx1">
+                  <a:lumMod val="75000"/>
+                  <a:lumOff val="25000"/>
+                </a:schemeClr>
+              </a:solidFill>
+              <a:latin typeface="Calibri" panose="020F0502020204030204" pitchFamily="34" charset="0"/>
+            </a:endParaRPr>
+          </a:p>
+          <a:p>
+            <a:endParaRPr lang="pt-BR" sz="2000" dirty="0" smtClean="0">
+              <a:solidFill>
+                <a:schemeClr val="tx1">
+                  <a:lumMod val="75000"/>
+                  <a:lumOff val="25000"/>
+                </a:schemeClr>
+              </a:solidFill>
+              <a:latin typeface="Calibri" panose="020F0502020204030204" pitchFamily="34" charset="0"/>
+            </a:endParaRPr>
+          </a:p>
+          <a:p>
+            <a:endParaRPr lang="pt-BR" sz="2000" dirty="0">
+              <a:solidFill>
+                <a:schemeClr val="tx1">
+                  <a:lumMod val="75000"/>
+                  <a:lumOff val="25000"/>
+                </a:schemeClr>
+              </a:solidFill>
+              <a:latin typeface="Calibri" panose="020F0502020204030204" pitchFamily="34" charset="0"/>
+            </a:endParaRPr>
+          </a:p>
+          <a:p>
+            <a:endParaRPr lang="pt-BR" sz="2000" dirty="0" smtClean="0">
+              <a:solidFill>
+                <a:schemeClr val="tx1">
+                  <a:lumMod val="75000"/>
+                  <a:lumOff val="25000"/>
+                </a:schemeClr>
+              </a:solidFill>
+              <a:latin typeface="Calibri" panose="020F0502020204030204" pitchFamily="34" charset="0"/>
+            </a:endParaRPr>
+          </a:p>
+          <a:p>
+            <a:endParaRPr lang="pt-BR" sz="2000" dirty="0">
+              <a:solidFill>
+                <a:schemeClr val="tx1">
+                  <a:lumMod val="75000"/>
+                  <a:lumOff val="25000"/>
+                </a:schemeClr>
+              </a:solidFill>
+              <a:latin typeface="Calibri" panose="020F0502020204030204" pitchFamily="34" charset="0"/>
+            </a:endParaRPr>
+          </a:p>
+          <a:p>
+            <a:pPr marL="0" indent="0" algn="ctr">
+              <a:buNone/>
+            </a:pPr>
+            <a:r>
+              <a:rPr lang="pt-BR" sz="1400" dirty="0" smtClean="0">
+                <a:solidFill>
+                  <a:schemeClr val="tx1">
+                    <a:lumMod val="75000"/>
+                    <a:lumOff val="25000"/>
+                  </a:schemeClr>
+                </a:solidFill>
+                <a:latin typeface="Calibri" panose="020F0502020204030204" pitchFamily="34" charset="0"/>
+              </a:rPr>
+              <a:t>Histograma acumulado por f’ e f’’, para fronteiras como o modelo assumido.</a:t>
+            </a:r>
+          </a:p>
+        </p:txBody>
+      </p:sp>
+      <p:pic>
+        <p:nvPicPr>
+          <p:cNvPr id="2053" name="Picture 5"/>
+          <p:cNvPicPr>
+            <a:picLocks noChangeAspect="1" noChangeArrowheads="1"/>
+          </p:cNvPicPr>
+          <p:nvPr/>
+        </p:nvPicPr>
+        <p:blipFill>
+          <a:blip r:embed="rId2">
+            <a:extLst>
+              <a:ext uri="{28A0092B-C50C-407E-A947-70E740481C1C}">
+                <a14:useLocalDpi xmlns:a14="http://schemas.microsoft.com/office/drawing/2010/main" val="0"/>
+              </a:ext>
+            </a:extLst>
+          </a:blip>
+          <a:srcRect/>
+          <a:stretch>
+            <a:fillRect/>
+          </a:stretch>
+        </p:blipFill>
+        <p:spPr bwMode="auto">
+          <a:xfrm>
+            <a:off x="3176845" y="3505993"/>
+            <a:ext cx="2970330" cy="1453177"/>
+          </a:xfrm>
+          <a:prstGeom prst="rect">
+            <a:avLst/>
+          </a:prstGeom>
+          <a:noFill/>
+          <a:ln>
+            <a:noFill/>
+          </a:ln>
+          <a:extLst>
+            <a:ext uri="{909E8E84-426E-40DD-AFC4-6F175D3DCCD1}">
+              <a14:hiddenFill xmlns:a14="http://schemas.microsoft.com/office/drawing/2010/main">
+                <a:solidFill>
+                  <a:schemeClr val="accent1"/>
+                </a:solidFill>
+              </a14:hiddenFill>
+            </a:ext>
+            <a:ext uri="{91240B29-F687-4F45-9708-019B960494DF}">
+              <a14:hiddenLine xmlns:a14="http://schemas.microsoft.com/office/drawing/2010/main" w="9525">
+                <a:solidFill>
+                  <a:schemeClr val="tx1"/>
+                </a:solidFill>
+                <a:miter lim="800000"/>
+                <a:headEnd/>
+                <a:tailEnd/>
+              </a14:hiddenLine>
+            </a:ext>
+          </a:extLst>
+        </p:spPr>
+      </p:pic>
+    </p:spTree>
+    <p:extLst>
+      <p:ext uri="{BB962C8B-B14F-4D97-AF65-F5344CB8AC3E}">
+        <p14:creationId xmlns:p14="http://schemas.microsoft.com/office/powerpoint/2010/main" val="1160536994"/>
+      </p:ext>
+    </p:extLst>
+  </p:cSld>
+  <p:clrMapOvr>
+    <a:masterClrMapping/>
+  </p:clrMapOvr>
+  <p:timing>
+    <p:tnLst>
+      <p:par>
+        <p:cTn id="1" dur="indefinite" restart="never" nodeType="tmRoot"/>
+      </p:par>
+    </p:tnLst>
+  </p:timing>
+</p:sld>
+</file>
+
+<file path=ppt/slides/slide7.xml><?xml version="1.0" encoding="utf-8"?>
+<p:sld xmlns:a="http://schemas.openxmlformats.org/drawingml/2006/main" xmlns:r="http://schemas.openxmlformats.org/officeDocument/2006/relationships" xmlns:p="http://schemas.openxmlformats.org/presentationml/2006/main">
+  <p:cSld>
+    <p:spTree>
+      <p:nvGrpSpPr>
+        <p:cNvPr id="1" name=""/>
+        <p:cNvGrpSpPr/>
+        <p:nvPr/>
+      </p:nvGrpSpPr>
+      <p:grpSpPr>
+        <a:xfrm>
+          <a:off x="0" y="0"/>
+          <a:ext cx="0" cy="0"/>
+          <a:chOff x="0" y="0"/>
+          <a:chExt cx="0" cy="0"/>
+        </a:xfrm>
+      </p:grpSpPr>
+      <p:sp>
+        <p:nvSpPr>
+          <p:cNvPr id="2" name="Title 1"/>
+          <p:cNvSpPr>
+            <a:spLocks noGrp="1"/>
+          </p:cNvSpPr>
+          <p:nvPr>
+            <p:ph type="title"/>
+          </p:nvPr>
+        </p:nvSpPr>
+        <p:spPr/>
+        <p:txBody>
+          <a:bodyPr anchor="ctr"/>
+          <a:lstStyle/>
+          <a:p>
+            <a:r>
+              <a:rPr lang="en-US" sz="4400" dirty="0" err="1">
+                <a:latin typeface="Calibri" panose="020F0502020204030204" pitchFamily="34" charset="0"/>
+              </a:rPr>
+              <a:t>Solução</a:t>
+            </a:r>
+            <a:r>
+              <a:rPr lang="en-US" sz="4400" dirty="0">
+                <a:latin typeface="Calibri" panose="020F0502020204030204" pitchFamily="34" charset="0"/>
+              </a:rPr>
+              <a:t> </a:t>
+            </a:r>
+            <a:r>
+              <a:rPr lang="en-US" sz="4400" dirty="0" err="1">
+                <a:latin typeface="Calibri" panose="020F0502020204030204" pitchFamily="34" charset="0"/>
+              </a:rPr>
+              <a:t>Proposta</a:t>
+            </a:r>
+            <a:endParaRPr lang="pt-BR" sz="4400" dirty="0"/>
+          </a:p>
+        </p:txBody>
+      </p:sp>
+      <p:sp>
+        <p:nvSpPr>
+          <p:cNvPr id="3" name="Content Placeholder 2"/>
+          <p:cNvSpPr>
+            <a:spLocks noGrp="1"/>
+          </p:cNvSpPr>
+          <p:nvPr>
+            <p:ph idx="1"/>
+          </p:nvPr>
+        </p:nvSpPr>
+        <p:spPr/>
+        <p:txBody>
+          <a:bodyPr>
+            <a:normAutofit/>
+          </a:bodyPr>
+          <a:lstStyle/>
+          <a:p>
+            <a:endParaRPr lang="pt-BR" sz="2000" dirty="0" smtClean="0">
+              <a:solidFill>
+                <a:schemeClr val="tx1">
+                  <a:lumMod val="75000"/>
+                  <a:lumOff val="25000"/>
+                </a:schemeClr>
+              </a:solidFill>
+              <a:latin typeface="Calibri" panose="020F0502020204030204" pitchFamily="34" charset="0"/>
+            </a:endParaRPr>
+          </a:p>
+          <a:p>
+            <a:r>
+              <a:rPr lang="pt-BR" sz="2000" dirty="0" smtClean="0">
+                <a:solidFill>
+                  <a:schemeClr val="tx1">
+                    <a:lumMod val="75000"/>
+                    <a:lumOff val="25000"/>
+                  </a:schemeClr>
+                </a:solidFill>
+                <a:latin typeface="Calibri" panose="020F0502020204030204" pitchFamily="34" charset="0"/>
+              </a:rPr>
+              <a:t>Dado o modelo matemático para a fronteira é possível extrair a distância </a:t>
+            </a:r>
+            <a:r>
+              <a:rPr lang="pt-BR" sz="2000" b="1" i="1" dirty="0" smtClean="0">
+                <a:solidFill>
+                  <a:schemeClr val="tx1">
+                    <a:lumMod val="75000"/>
+                    <a:lumOff val="25000"/>
+                  </a:schemeClr>
+                </a:solidFill>
+                <a:latin typeface="Calibri" panose="020F0502020204030204" pitchFamily="34" charset="0"/>
+              </a:rPr>
+              <a:t>x</a:t>
+            </a:r>
+            <a:r>
+              <a:rPr lang="pt-BR" sz="2000" dirty="0" smtClean="0">
+                <a:solidFill>
+                  <a:schemeClr val="tx1">
+                    <a:lumMod val="75000"/>
+                    <a:lumOff val="25000"/>
+                  </a:schemeClr>
+                </a:solidFill>
+                <a:latin typeface="Calibri" panose="020F0502020204030204" pitchFamily="34" charset="0"/>
+              </a:rPr>
+              <a:t> de cada </a:t>
+            </a:r>
+            <a:r>
+              <a:rPr lang="pt-BR" sz="2000" dirty="0" smtClean="0">
+                <a:solidFill>
+                  <a:schemeClr val="tx1">
+                    <a:lumMod val="75000"/>
+                    <a:lumOff val="25000"/>
+                  </a:schemeClr>
+                </a:solidFill>
+                <a:latin typeface="Calibri" panose="020F0502020204030204" pitchFamily="34" charset="0"/>
+              </a:rPr>
+              <a:t>valor para </a:t>
+            </a:r>
+            <a:r>
+              <a:rPr lang="pt-BR" sz="2000" dirty="0" smtClean="0">
+                <a:solidFill>
+                  <a:schemeClr val="tx1">
+                    <a:lumMod val="75000"/>
+                    <a:lumOff val="25000"/>
+                  </a:schemeClr>
+                </a:solidFill>
+                <a:latin typeface="Calibri" panose="020F0502020204030204" pitchFamily="34" charset="0"/>
+              </a:rPr>
+              <a:t>a fronteira mais próxima, na direção do gradiente.</a:t>
+            </a:r>
           </a:p>
         </p:txBody>
       </p:sp>
@@ -5253,7 +7089,7 @@
 </p:sld>
 </file>
 
-<file path=ppt/slides/slide6.xml><?xml version="1.0" encoding="utf-8"?>
+<file path=ppt/slides/slide8.xml><?xml version="1.0" encoding="utf-8"?>
 <p:sld xmlns:a="http://schemas.openxmlformats.org/drawingml/2006/main" xmlns:r="http://schemas.openxmlformats.org/officeDocument/2006/relationships" xmlns:p="http://schemas.openxmlformats.org/presentationml/2006/main">
   <p:cSld>
     <p:spTree>
@@ -5345,58 +7181,8 @@
                 </a:solidFill>
                 <a:latin typeface="Calibri" panose="020F0502020204030204" pitchFamily="34" charset="0"/>
               </a:rPr>
-              <a:t>A função de opacidade então é uma relação entre alpha e a distância </a:t>
-            </a:r>
-            <a:r>
-              <a:rPr lang="pt-BR" sz="2000" b="1" i="1" dirty="0" smtClean="0">
-                <a:solidFill>
-                  <a:schemeClr val="tx1">
-                    <a:lumMod val="75000"/>
-                    <a:lumOff val="25000"/>
-                  </a:schemeClr>
-                </a:solidFill>
-                <a:latin typeface="Calibri" panose="020F0502020204030204" pitchFamily="34" charset="0"/>
-              </a:rPr>
-              <a:t>x</a:t>
-            </a:r>
-            <a:r>
-              <a:rPr lang="pt-BR" sz="2000" dirty="0" smtClean="0">
-                <a:solidFill>
-                  <a:schemeClr val="tx1">
-                    <a:lumMod val="75000"/>
-                    <a:lumOff val="25000"/>
-                  </a:schemeClr>
-                </a:solidFill>
-                <a:latin typeface="Calibri" panose="020F0502020204030204" pitchFamily="34" charset="0"/>
-              </a:rPr>
-              <a:t> para cada </a:t>
-            </a:r>
-            <a:r>
-              <a:rPr lang="pt-BR" sz="2000" dirty="0" err="1" smtClean="0">
-                <a:solidFill>
-                  <a:schemeClr val="tx1">
-                    <a:lumMod val="75000"/>
-                    <a:lumOff val="25000"/>
-                  </a:schemeClr>
-                </a:solidFill>
-                <a:latin typeface="Calibri" panose="020F0502020204030204" pitchFamily="34" charset="0"/>
-              </a:rPr>
-              <a:t>voxel</a:t>
-            </a:r>
-            <a:r>
-              <a:rPr lang="pt-BR" sz="2000" dirty="0" smtClean="0">
-                <a:solidFill>
-                  <a:schemeClr val="tx1">
-                    <a:lumMod val="75000"/>
-                    <a:lumOff val="25000"/>
-                  </a:schemeClr>
-                </a:solidFill>
-                <a:latin typeface="Calibri" panose="020F0502020204030204" pitchFamily="34" charset="0"/>
-              </a:rPr>
-              <a:t>.</a:t>
-            </a:r>
-          </a:p>
-          <a:p>
+              <a:t>A partir do histograma:</a:t>
+            </a:r>
             <a:endParaRPr lang="pt-BR" sz="2000" dirty="0" smtClean="0">
               <a:solidFill>
                 <a:schemeClr val="tx1">
@@ -5429,8 +7215,10 @@
                 </a:solidFill>
                 <a:latin typeface="Calibri" panose="020F0502020204030204" pitchFamily="34" charset="0"/>
               </a:rPr>
-              <a:t>g(v</a:t>
-            </a:r>
+              <a:t>g(v) =&gt; Média da primeira derivada.</a:t>
+            </a:r>
+          </a:p>
+          <a:p>
             <a:r>
               <a:rPr lang="pt-BR" sz="2000" dirty="0" smtClean="0">
                 <a:solidFill>
@@ -5441,10 +7229,10 @@
                 </a:solidFill>
                 <a:latin typeface="Calibri" panose="020F0502020204030204" pitchFamily="34" charset="0"/>
               </a:rPr>
-              <a:t>) =&gt; </a:t>
-            </a:r>
-            <a:r>
-              <a:rPr lang="pt-BR" sz="2000" dirty="0" smtClean="0">
+              <a:t>h(v, g) </a:t>
+            </a:r>
+            <a:r>
+              <a:rPr lang="pt-BR" sz="2000" dirty="0">
                 <a:solidFill>
                   <a:schemeClr val="tx1">
                     <a:lumMod val="75000"/>
@@ -5453,19 +7241,8 @@
                 </a:solidFill>
                 <a:latin typeface="Calibri" panose="020F0502020204030204" pitchFamily="34" charset="0"/>
               </a:rPr>
-              <a:t>Média da primeira derivada.</a:t>
-            </a:r>
-            <a:endParaRPr lang="pt-BR" sz="2000" dirty="0" smtClean="0">
-              <a:solidFill>
-                <a:schemeClr val="tx1">
-                  <a:lumMod val="75000"/>
-                  <a:lumOff val="25000"/>
-                </a:schemeClr>
-              </a:solidFill>
-              <a:latin typeface="Calibri" panose="020F0502020204030204" pitchFamily="34" charset="0"/>
-            </a:endParaRPr>
-          </a:p>
-          <a:p>
+              <a:t>=&gt; Média da </a:t>
+            </a:r>
             <a:r>
               <a:rPr lang="pt-BR" sz="2000" dirty="0" smtClean="0">
                 <a:solidFill>
@@ -5476,53 +7253,8 @@
                 </a:solidFill>
                 <a:latin typeface="Calibri" panose="020F0502020204030204" pitchFamily="34" charset="0"/>
               </a:rPr>
-              <a:t>h(v, g) </a:t>
-            </a:r>
-            <a:r>
-              <a:rPr lang="pt-BR" sz="2000" dirty="0">
-                <a:solidFill>
-                  <a:schemeClr val="tx1">
-                    <a:lumMod val="75000"/>
-                    <a:lumOff val="25000"/>
-                  </a:schemeClr>
-                </a:solidFill>
-                <a:latin typeface="Calibri" panose="020F0502020204030204" pitchFamily="34" charset="0"/>
-              </a:rPr>
-              <a:t>=&gt; </a:t>
-            </a:r>
-            <a:r>
-              <a:rPr lang="pt-BR" sz="2000" dirty="0">
-                <a:solidFill>
-                  <a:schemeClr val="tx1">
-                    <a:lumMod val="75000"/>
-                    <a:lumOff val="25000"/>
-                  </a:schemeClr>
-                </a:solidFill>
-                <a:latin typeface="Calibri" panose="020F0502020204030204" pitchFamily="34" charset="0"/>
-              </a:rPr>
-              <a:t>Média da </a:t>
-            </a:r>
-            <a:r>
-              <a:rPr lang="pt-BR" sz="2000" dirty="0" smtClean="0">
-                <a:solidFill>
-                  <a:schemeClr val="tx1">
-                    <a:lumMod val="75000"/>
-                    <a:lumOff val="25000"/>
-                  </a:schemeClr>
-                </a:solidFill>
-                <a:latin typeface="Calibri" panose="020F0502020204030204" pitchFamily="34" charset="0"/>
-              </a:rPr>
               <a:t>segunda derivada.</a:t>
             </a:r>
-            <a:endParaRPr lang="pt-BR" sz="2000" dirty="0" smtClean="0">
-              <a:solidFill>
-                <a:schemeClr val="tx1">
-                  <a:lumMod val="75000"/>
-                  <a:lumOff val="25000"/>
-                </a:schemeClr>
-              </a:solidFill>
-              <a:latin typeface="Calibri" panose="020F0502020204030204" pitchFamily="34" charset="0"/>
-            </a:endParaRPr>
           </a:p>
         </p:txBody>
       </p:sp>
@@ -5548,7 +7280,7 @@
         </p:blipFill>
         <p:spPr>
           <a:xfrm>
-            <a:off x="2485776" y="4464115"/>
+            <a:off x="2474727" y="3711304"/>
             <a:ext cx="3904762" cy="761905"/>
           </a:xfrm>
           <a:prstGeom prst="rect">
@@ -5576,7 +7308,7 @@
 </p:sld>
 </file>
 
-<file path=ppt/slides/slide7.xml><?xml version="1.0" encoding="utf-8"?>
+<file path=ppt/slides/slide9.xml><?xml version="1.0" encoding="utf-8"?>
 <p:sld xmlns:a="http://schemas.openxmlformats.org/drawingml/2006/main" xmlns:r="http://schemas.openxmlformats.org/officeDocument/2006/relationships" xmlns:p="http://schemas.openxmlformats.org/presentationml/2006/main">
   <p:cSld>
     <p:spTree>
@@ -5648,7 +7380,7 @@
           <a:lstStyle/>
           <a:p>
             <a:r>
-              <a:rPr lang="pt-BR" sz="2000" dirty="0" smtClean="0">
+              <a:rPr lang="pt-BR" sz="2000" dirty="0">
                 <a:solidFill>
                   <a:schemeClr val="tx1">
                     <a:lumMod val="75000"/>
@@ -5657,10 +7389,10 @@
                 </a:solidFill>
                 <a:latin typeface="Calibri" panose="020F0502020204030204" pitchFamily="34" charset="0"/>
               </a:rPr>
-              <a:t>Cabe ao usuário o controle fino de a distância</a:t>
-            </a:r>
-            <a:r>
-              <a:rPr lang="pt-BR" sz="2000" dirty="0" smtClean="0">
+              <a:t>A função de opacidade então é uma relação entre alpha e a distância </a:t>
+            </a:r>
+            <a:r>
+              <a:rPr lang="pt-BR" sz="2000" b="1" i="1" dirty="0" smtClean="0">
                 <a:solidFill>
                   <a:schemeClr val="tx1">
                     <a:lumMod val="75000"/>
@@ -5669,7 +7401,78 @@
                 </a:solidFill>
                 <a:latin typeface="Calibri" panose="020F0502020204030204" pitchFamily="34" charset="0"/>
               </a:rPr>
-              <a:t> se relaciona com o valor de opacidade.</a:t>
+              <a:t>x</a:t>
+            </a:r>
+            <a:r>
+              <a:rPr lang="pt-BR" sz="2000" dirty="0" smtClean="0">
+                <a:solidFill>
+                  <a:schemeClr val="tx1">
+                    <a:lumMod val="75000"/>
+                    <a:lumOff val="25000"/>
+                  </a:schemeClr>
+                </a:solidFill>
+                <a:latin typeface="Calibri" panose="020F0502020204030204" pitchFamily="34" charset="0"/>
+              </a:rPr>
+              <a:t>.</a:t>
+            </a:r>
+            <a:endParaRPr lang="pt-BR" sz="2000" dirty="0" smtClean="0">
+              <a:solidFill>
+                <a:schemeClr val="tx1">
+                  <a:lumMod val="75000"/>
+                  <a:lumOff val="25000"/>
+                </a:schemeClr>
+              </a:solidFill>
+              <a:latin typeface="Calibri" panose="020F0502020204030204" pitchFamily="34" charset="0"/>
+            </a:endParaRPr>
+          </a:p>
+          <a:p>
+            <a:r>
+              <a:rPr lang="pt-BR" sz="2000" dirty="0" smtClean="0">
+                <a:solidFill>
+                  <a:schemeClr val="tx1">
+                    <a:lumMod val="75000"/>
+                    <a:lumOff val="25000"/>
+                  </a:schemeClr>
+                </a:solidFill>
+                <a:latin typeface="Calibri" panose="020F0502020204030204" pitchFamily="34" charset="0"/>
+              </a:rPr>
+              <a:t>Cabe </a:t>
+            </a:r>
+            <a:r>
+              <a:rPr lang="pt-BR" sz="2000" dirty="0" smtClean="0">
+                <a:solidFill>
+                  <a:schemeClr val="tx1">
+                    <a:lumMod val="75000"/>
+                    <a:lumOff val="25000"/>
+                  </a:schemeClr>
+                </a:solidFill>
+                <a:latin typeface="Calibri" panose="020F0502020204030204" pitchFamily="34" charset="0"/>
+              </a:rPr>
+              <a:t>ao usuário o controle fino de </a:t>
+            </a:r>
+            <a:r>
+              <a:rPr lang="pt-BR" sz="2000" dirty="0" smtClean="0">
+                <a:solidFill>
+                  <a:schemeClr val="tx1">
+                    <a:lumMod val="75000"/>
+                    <a:lumOff val="25000"/>
+                  </a:schemeClr>
+                </a:solidFill>
+                <a:latin typeface="Calibri" panose="020F0502020204030204" pitchFamily="34" charset="0"/>
+              </a:rPr>
+              <a:t>como a </a:t>
+            </a:r>
+            <a:r>
+              <a:rPr lang="pt-BR" sz="2000" dirty="0" smtClean="0">
+                <a:solidFill>
+                  <a:schemeClr val="tx1">
+                    <a:lumMod val="75000"/>
+                    <a:lumOff val="25000"/>
+                  </a:schemeClr>
+                </a:solidFill>
+                <a:latin typeface="Calibri" panose="020F0502020204030204" pitchFamily="34" charset="0"/>
+              </a:rPr>
+              <a:t>distância se relaciona com o valor de opacidade.</a:t>
             </a:r>
           </a:p>
           <a:p>
@@ -5708,7 +7511,7 @@
         </p:blipFill>
         <p:spPr bwMode="auto">
           <a:xfrm>
-            <a:off x="2688224" y="2933945"/>
+            <a:off x="2546775" y="2791846"/>
             <a:ext cx="3816456" cy="3334317"/>
           </a:xfrm>
           <a:prstGeom prst="rect">
@@ -5739,141 +7542,10 @@
           </a:extLst>
         </p:spPr>
       </p:pic>
-      <p:pic>
-        <p:nvPicPr>
-          <p:cNvPr id="4" name="Imagem 3"/>
-          <p:cNvPicPr>
-            <a:picLocks noChangeAspect="1"/>
-          </p:cNvPicPr>
-          <p:nvPr/>
-        </p:nvPicPr>
-        <p:blipFill>
-          <a:blip r:embed="rId3">
-            <a:extLst>
-              <a:ext uri="{28A0092B-C50C-407E-A947-70E740481C1C}">
-                <a14:useLocalDpi xmlns:a14="http://schemas.microsoft.com/office/drawing/2010/main" val="0"/>
-              </a:ext>
-            </a:extLst>
-          </a:blip>
-          <a:stretch>
-            <a:fillRect/>
-          </a:stretch>
-        </p:blipFill>
-        <p:spPr>
-          <a:xfrm>
-            <a:off x="3215499" y="2182497"/>
-            <a:ext cx="2761905" cy="380952"/>
-          </a:xfrm>
-          <a:prstGeom prst="rect">
-            <a:avLst/>
-          </a:prstGeom>
-        </p:spPr>
-      </p:pic>
     </p:spTree>
     <p:extLst>
       <p:ext uri="{BB962C8B-B14F-4D97-AF65-F5344CB8AC3E}">
         <p14:creationId xmlns:p14="http://schemas.microsoft.com/office/powerpoint/2010/main" val="3224716730"/>
-      </p:ext>
-    </p:extLst>
-  </p:cSld>
-  <p:clrMapOvr>
-    <a:masterClrMapping/>
-  </p:clrMapOvr>
-  <p:timing>
-    <p:tnLst>
-      <p:par>
-        <p:cTn id="1" dur="indefinite" restart="never" nodeType="tmRoot"/>
-      </p:par>
-    </p:tnLst>
-  </p:timing>
-</p:sld>
-</file>
-
-<file path=ppt/slides/slide8.xml><?xml version="1.0" encoding="utf-8"?>
-<p:sld xmlns:a="http://schemas.openxmlformats.org/drawingml/2006/main" xmlns:r="http://schemas.openxmlformats.org/officeDocument/2006/relationships" xmlns:p="http://schemas.openxmlformats.org/presentationml/2006/main">
-  <p:cSld>
-    <p:spTree>
-      <p:nvGrpSpPr>
-        <p:cNvPr id="1" name=""/>
-        <p:cNvGrpSpPr/>
-        <p:nvPr/>
-      </p:nvGrpSpPr>
-      <p:grpSpPr>
-        <a:xfrm>
-          <a:off x="0" y="0"/>
-          <a:ext cx="0" cy="0"/>
-          <a:chOff x="0" y="0"/>
-          <a:chExt cx="0" cy="0"/>
-        </a:xfrm>
-      </p:grpSpPr>
-      <p:sp>
-        <p:nvSpPr>
-          <p:cNvPr id="4" name="Título 3"/>
-          <p:cNvSpPr>
-            <a:spLocks noGrp="1"/>
-          </p:cNvSpPr>
-          <p:nvPr>
-            <p:ph type="title"/>
-          </p:nvPr>
-        </p:nvSpPr>
-        <p:spPr/>
-        <p:txBody>
-          <a:bodyPr/>
-          <a:lstStyle/>
-          <a:p>
-            <a:r>
-              <a:rPr lang="pt-BR" sz="4400" dirty="0" smtClean="0"/>
-              <a:t>Dúvidas?</a:t>
-            </a:r>
-            <a:endParaRPr lang="pt-BR" sz="4400" dirty="0"/>
-          </a:p>
-        </p:txBody>
-      </p:sp>
-      <p:sp>
-        <p:nvSpPr>
-          <p:cNvPr id="7" name="Retângulo 6"/>
-          <p:cNvSpPr/>
-          <p:nvPr/>
-        </p:nvSpPr>
-        <p:spPr>
-          <a:xfrm>
-            <a:off x="3206882" y="5904275"/>
-            <a:ext cx="2730235" cy="369332"/>
-          </a:xfrm>
-          <a:prstGeom prst="rect">
-            <a:avLst/>
-          </a:prstGeom>
-        </p:spPr>
-        <p:txBody>
-          <a:bodyPr wrap="none">
-            <a:spAutoFit/>
-          </a:bodyPr>
-          <a:lstStyle/>
-          <a:p>
-            <a:r>
-              <a:rPr lang="pt-BR" dirty="0" smtClean="0">
-                <a:solidFill>
-                  <a:schemeClr val="accent1">
-                    <a:lumMod val="50000"/>
-                  </a:schemeClr>
-                </a:solidFill>
-              </a:rPr>
-              <a:t>rmesquita@inf.puc-rio.br</a:t>
-            </a:r>
-            <a:endParaRPr lang="pt-BR" dirty="0">
-              <a:solidFill>
-                <a:schemeClr val="accent1">
-                  <a:lumMod val="50000"/>
-                </a:schemeClr>
-              </a:solidFill>
-            </a:endParaRPr>
-          </a:p>
-        </p:txBody>
-      </p:sp>
-    </p:spTree>
-    <p:extLst>
-      <p:ext uri="{BB962C8B-B14F-4D97-AF65-F5344CB8AC3E}">
-        <p14:creationId xmlns:p14="http://schemas.microsoft.com/office/powerpoint/2010/main" val="2453807565"/>
       </p:ext>
     </p:extLst>
   </p:cSld>

</xml_diff>